<commit_message>
Infix notation, class with parameters added
</commit_message>
<xml_diff>
--- a/Scala_Features.pptx
+++ b/Scala_Features.pptx
@@ -7,15 +7,19 @@
   <p:sldIdLst>
     <p:sldId id="256" r:id="rId2"/>
     <p:sldId id="257" r:id="rId3"/>
-    <p:sldId id="270" r:id="rId4"/>
-    <p:sldId id="271" r:id="rId5"/>
-    <p:sldId id="272" r:id="rId6"/>
-    <p:sldId id="273" r:id="rId7"/>
-    <p:sldId id="274" r:id="rId8"/>
-    <p:sldId id="275" r:id="rId9"/>
-    <p:sldId id="276" r:id="rId10"/>
-    <p:sldId id="277" r:id="rId11"/>
-    <p:sldId id="269" r:id="rId12"/>
+    <p:sldId id="281" r:id="rId4"/>
+    <p:sldId id="280" r:id="rId5"/>
+    <p:sldId id="279" r:id="rId6"/>
+    <p:sldId id="270" r:id="rId7"/>
+    <p:sldId id="271" r:id="rId8"/>
+    <p:sldId id="272" r:id="rId9"/>
+    <p:sldId id="273" r:id="rId10"/>
+    <p:sldId id="274" r:id="rId11"/>
+    <p:sldId id="275" r:id="rId12"/>
+    <p:sldId id="276" r:id="rId13"/>
+    <p:sldId id="277" r:id="rId14"/>
+    <p:sldId id="278" r:id="rId15"/>
+    <p:sldId id="269" r:id="rId16"/>
   </p:sldIdLst>
   <p:sldSz cx="9144000" cy="6858000" type="screen4x3"/>
   <p:notesSz cx="6858000" cy="9144000"/>
@@ -305,7 +309,7 @@
           <a:p>
             <a:fld id="{8F235549-BF0A-4B98-8561-3786244E808C}" type="datetimeFigureOut">
               <a:rPr lang="en-US" smtClean="0"/>
-              <a:t>5/9/2017</a:t>
+              <a:t>5/13/2017</a:t>
             </a:fld>
             <a:endParaRPr lang="en-US"/>
           </a:p>
@@ -505,7 +509,7 @@
           <a:p>
             <a:fld id="{8F235549-BF0A-4B98-8561-3786244E808C}" type="datetimeFigureOut">
               <a:rPr lang="en-US" smtClean="0"/>
-              <a:t>5/9/2017</a:t>
+              <a:t>5/13/2017</a:t>
             </a:fld>
             <a:endParaRPr lang="en-US"/>
           </a:p>
@@ -680,7 +684,7 @@
           <a:p>
             <a:fld id="{8F235549-BF0A-4B98-8561-3786244E808C}" type="datetimeFigureOut">
               <a:rPr lang="en-US" smtClean="0"/>
-              <a:t>5/9/2017</a:t>
+              <a:t>5/13/2017</a:t>
             </a:fld>
             <a:endParaRPr lang="en-US"/>
           </a:p>
@@ -845,7 +849,7 @@
           <a:p>
             <a:fld id="{8F235549-BF0A-4B98-8561-3786244E808C}" type="datetimeFigureOut">
               <a:rPr lang="en-US" smtClean="0"/>
-              <a:t>5/9/2017</a:t>
+              <a:t>5/13/2017</a:t>
             </a:fld>
             <a:endParaRPr lang="en-US"/>
           </a:p>
@@ -1093,7 +1097,7 @@
           <a:p>
             <a:fld id="{8F235549-BF0A-4B98-8561-3786244E808C}" type="datetimeFigureOut">
               <a:rPr lang="en-US" smtClean="0"/>
-              <a:t>5/9/2017</a:t>
+              <a:t>5/13/2017</a:t>
             </a:fld>
             <a:endParaRPr lang="en-US"/>
           </a:p>
@@ -1411,7 +1415,7 @@
           <a:p>
             <a:fld id="{8F235549-BF0A-4B98-8561-3786244E808C}" type="datetimeFigureOut">
               <a:rPr lang="en-US" smtClean="0"/>
-              <a:t>5/9/2017</a:t>
+              <a:t>5/13/2017</a:t>
             </a:fld>
             <a:endParaRPr lang="en-US"/>
           </a:p>
@@ -1877,7 +1881,7 @@
           <a:p>
             <a:fld id="{8F235549-BF0A-4B98-8561-3786244E808C}" type="datetimeFigureOut">
               <a:rPr lang="en-US" smtClean="0"/>
-              <a:t>5/9/2017</a:t>
+              <a:t>5/13/2017</a:t>
             </a:fld>
             <a:endParaRPr lang="en-US"/>
           </a:p>
@@ -2025,7 +2029,7 @@
           <a:p>
             <a:fld id="{8F235549-BF0A-4B98-8561-3786244E808C}" type="datetimeFigureOut">
               <a:rPr lang="en-US" smtClean="0"/>
-              <a:t>5/9/2017</a:t>
+              <a:t>5/13/2017</a:t>
             </a:fld>
             <a:endParaRPr lang="en-US"/>
           </a:p>
@@ -2115,7 +2119,7 @@
           <a:p>
             <a:fld id="{8F235549-BF0A-4B98-8561-3786244E808C}" type="datetimeFigureOut">
               <a:rPr lang="en-US" smtClean="0"/>
-              <a:t>5/9/2017</a:t>
+              <a:t>5/13/2017</a:t>
             </a:fld>
             <a:endParaRPr lang="en-US"/>
           </a:p>
@@ -2389,7 +2393,7 @@
           <a:p>
             <a:fld id="{8F235549-BF0A-4B98-8561-3786244E808C}" type="datetimeFigureOut">
               <a:rPr lang="en-US" smtClean="0"/>
-              <a:t>5/9/2017</a:t>
+              <a:t>5/13/2017</a:t>
             </a:fld>
             <a:endParaRPr lang="en-US"/>
           </a:p>
@@ -2694,7 +2698,7 @@
           <a:p>
             <a:fld id="{8F235549-BF0A-4B98-8561-3786244E808C}" type="datetimeFigureOut">
               <a:rPr lang="en-US" smtClean="0"/>
-              <a:t>5/9/2017</a:t>
+              <a:t>5/13/2017</a:t>
             </a:fld>
             <a:endParaRPr lang="en-US"/>
           </a:p>
@@ -2992,7 +2996,7 @@
           <a:p>
             <a:fld id="{8F235549-BF0A-4B98-8561-3786244E808C}" type="datetimeFigureOut">
               <a:rPr lang="en-US" smtClean="0"/>
-              <a:t>5/9/2017</a:t>
+              <a:t>5/13/2017</a:t>
             </a:fld>
             <a:endParaRPr lang="en-US"/>
           </a:p>
@@ -3406,11 +3410,7 @@
           <a:p>
             <a:r>
               <a:rPr lang="en-US" dirty="0" smtClean="0"/>
-              <a:t>SCALA </a:t>
-            </a:r>
-            <a:r>
-              <a:rPr lang="en-US" dirty="0" smtClean="0"/>
-              <a:t>Features</a:t>
+              <a:t>SCALA Features</a:t>
             </a:r>
             <a:br>
               <a:rPr lang="en-US" dirty="0" smtClean="0"/>
@@ -3481,9 +3481,12 @@
           <a:p>
             <a:r>
               <a:rPr lang="en-US" dirty="0" smtClean="0"/>
-              <a:t>Higher Order Functions</a:t>
-            </a:r>
-            <a:endParaRPr lang="en-US" dirty="0"/>
+              <a:t>Vectors</a:t>
+            </a:r>
+            <a:r>
+              <a:rPr lang="en-US" dirty="0"/>
+              <a:t>, Sets – Sequence Collections</a:t>
+            </a:r>
           </a:p>
         </p:txBody>
       </p:sp>
@@ -3504,137 +3507,125 @@
           </a:bodyPr>
           <a:lstStyle/>
           <a:p>
+            <a:pPr marL="0" indent="0">
+              <a:buNone/>
+            </a:pPr>
+            <a:r>
+              <a:rPr lang="en-GB" sz="1800" b="1" dirty="0" smtClean="0"/>
+              <a:t>Vectors:-</a:t>
+            </a:r>
+          </a:p>
+          <a:p>
+            <a:r>
+              <a:rPr lang="en-GB" sz="1600" dirty="0" smtClean="0"/>
+              <a:t>A </a:t>
+            </a:r>
             <a:r>
               <a:rPr lang="en-GB" sz="1600" b="1" dirty="0" smtClean="0"/>
-              <a:t>A function </a:t>
-            </a:r>
-            <a:r>
-              <a:rPr lang="en-GB" sz="1600" dirty="0" smtClean="0"/>
-              <a:t>which takes </a:t>
-            </a:r>
+              <a:t>linked list</a:t>
+            </a:r>
+            <a:r>
+              <a:rPr lang="en-GB" sz="1600" dirty="0" smtClean="0"/>
+              <a:t> of 32 element arrays</a:t>
+            </a:r>
+          </a:p>
+          <a:p>
+            <a:r>
+              <a:rPr lang="en-GB" sz="1600" dirty="0" smtClean="0"/>
+              <a:t>2.15 billion possible elements</a:t>
+            </a:r>
+          </a:p>
+          <a:p>
+            <a:r>
+              <a:rPr lang="en-GB" sz="1600" dirty="0" smtClean="0"/>
+              <a:t>Indexed by hashing</a:t>
+            </a:r>
+          </a:p>
+          <a:p>
+            <a:r>
+              <a:rPr lang="en-GB" sz="1600" dirty="0" smtClean="0"/>
+              <a:t>Good performance</a:t>
+            </a:r>
+          </a:p>
+          <a:p>
+            <a:r>
+              <a:rPr lang="en-GB" sz="1600" b="1" dirty="0" smtClean="0">
+                <a:solidFill>
+                  <a:srgbClr val="00B050"/>
+                </a:solidFill>
+              </a:rPr>
+              <a:t>Constant time performance</a:t>
+            </a:r>
+            <a:r>
+              <a:rPr lang="en-GB" sz="1600" dirty="0" smtClean="0"/>
+              <a:t> for all operations. </a:t>
+            </a:r>
+            <a:r>
+              <a:rPr lang="en-GB" sz="1600" dirty="0"/>
+              <a:t>The operation takes effectively constant time, but this might depend on some assumptions such as maximum length of a vector or distribution of hash keys.</a:t>
+            </a:r>
+            <a:endParaRPr lang="en-GB" sz="1600" dirty="0" smtClean="0"/>
+          </a:p>
+          <a:p>
+            <a:pPr marL="0" indent="0">
+              <a:buNone/>
+            </a:pPr>
+            <a:endParaRPr lang="en-GB" sz="1600" dirty="0"/>
+          </a:p>
+          <a:p>
+            <a:pPr marL="0" indent="0">
+              <a:buNone/>
+            </a:pPr>
             <a:r>
               <a:rPr lang="en-GB" sz="1600" b="1" dirty="0" smtClean="0"/>
-              <a:t>another function</a:t>
-            </a:r>
-          </a:p>
-          <a:p>
-            <a:r>
-              <a:rPr lang="en-GB" sz="1600" dirty="0" smtClean="0"/>
-              <a:t>Typically, describes the “how” for work to be done in a container</a:t>
-            </a:r>
-          </a:p>
-          <a:p>
-            <a:r>
-              <a:rPr lang="en-GB" sz="1600" dirty="0" smtClean="0"/>
-              <a:t>The function passed to it describes the “what” that should be done to elements in the container</a:t>
-            </a:r>
-          </a:p>
-          <a:p>
+              <a:t>Sets:-</a:t>
+            </a:r>
+          </a:p>
+          <a:p>
+            <a:r>
+              <a:rPr lang="en-GB" sz="1600" dirty="0" smtClean="0"/>
+              <a:t>No duplicates permitted</a:t>
+            </a:r>
+          </a:p>
+          <a:p>
+            <a:r>
+              <a:rPr lang="en-GB" sz="1600" dirty="0" smtClean="0"/>
+              <a:t>Order is not guaranteed</a:t>
+            </a:r>
+          </a:p>
+          <a:p>
+            <a:r>
+              <a:rPr lang="en-GB" sz="1600" dirty="0" smtClean="0"/>
+              <a:t>The </a:t>
+            </a:r>
             <a:r>
               <a:rPr lang="en-GB" sz="1600" b="1" dirty="0" smtClean="0"/>
-              <a:t>Example:-</a:t>
-            </a:r>
-          </a:p>
-          <a:p>
-            <a:pPr lvl="1"/>
-            <a:r>
-              <a:rPr lang="en-GB" sz="1600" dirty="0" smtClean="0"/>
-              <a:t>res0.map(number =&gt; number + 1)</a:t>
-            </a:r>
-          </a:p>
-          <a:p>
-            <a:pPr lvl="1"/>
-            <a:r>
-              <a:rPr lang="en-GB" sz="1600" dirty="0" err="1" smtClean="0"/>
-              <a:t>flatMap</a:t>
-            </a:r>
-            <a:endParaRPr lang="en-GB" sz="1600" dirty="0" smtClean="0"/>
-          </a:p>
-          <a:p>
-            <a:pPr lvl="1"/>
-            <a:r>
-              <a:rPr lang="en-GB" sz="1600" dirty="0"/>
-              <a:t>f</a:t>
-            </a:r>
-            <a:r>
-              <a:rPr lang="en-GB" sz="1600" dirty="0" smtClean="0"/>
-              <a:t>ilter</a:t>
-            </a:r>
-          </a:p>
-          <a:p>
-            <a:pPr lvl="1"/>
-            <a:r>
-              <a:rPr lang="en-GB" sz="1600" dirty="0" err="1" smtClean="0"/>
-              <a:t>foreach</a:t>
-            </a:r>
-            <a:endParaRPr lang="en-GB" sz="1600" dirty="0" smtClean="0"/>
-          </a:p>
-          <a:p>
-            <a:pPr lvl="1"/>
-            <a:r>
-              <a:rPr lang="en-GB" sz="1600" dirty="0" smtClean="0"/>
-              <a:t>reduce</a:t>
-            </a:r>
-          </a:p>
-          <a:p>
-            <a:pPr lvl="1"/>
-            <a:r>
-              <a:rPr lang="en-GB" sz="1600" dirty="0"/>
-              <a:t>p</a:t>
-            </a:r>
-            <a:r>
-              <a:rPr lang="en-GB" sz="1600" dirty="0" smtClean="0"/>
-              <a:t>roduct</a:t>
-            </a:r>
-          </a:p>
-          <a:p>
-            <a:pPr lvl="1"/>
-            <a:r>
-              <a:rPr lang="en-GB" sz="1600" dirty="0"/>
-              <a:t>e</a:t>
-            </a:r>
-            <a:r>
-              <a:rPr lang="en-GB" sz="1600" dirty="0" smtClean="0"/>
-              <a:t>xists</a:t>
-            </a:r>
-          </a:p>
-          <a:p>
-            <a:pPr lvl="1"/>
-            <a:r>
-              <a:rPr lang="en-GB" sz="1600" dirty="0" smtClean="0"/>
-              <a:t>find</a:t>
-            </a:r>
-          </a:p>
-          <a:p>
-            <a:pPr lvl="1"/>
-            <a:r>
-              <a:rPr lang="en-GB" sz="1600" dirty="0" err="1" smtClean="0"/>
-              <a:t>groupby</a:t>
-            </a:r>
-            <a:endParaRPr lang="en-GB" sz="1600" dirty="0" smtClean="0"/>
-          </a:p>
-          <a:p>
-            <a:pPr lvl="1"/>
-            <a:r>
-              <a:rPr lang="en-GB" sz="1600" dirty="0" err="1" smtClean="0"/>
-              <a:t>takeWhile</a:t>
-            </a:r>
-            <a:r>
-              <a:rPr lang="en-GB" sz="1600" dirty="0" smtClean="0"/>
-              <a:t> and </a:t>
-            </a:r>
-            <a:r>
-              <a:rPr lang="en-GB" sz="1600" dirty="0" err="1" smtClean="0"/>
-              <a:t>dropWhile</a:t>
-            </a:r>
-            <a:endParaRPr lang="en-GB" sz="1600" dirty="0" smtClean="0"/>
+              <a:t>apply</a:t>
+            </a:r>
+            <a:r>
+              <a:rPr lang="en-GB" sz="1600" dirty="0" smtClean="0"/>
+              <a:t> method on an instance checks to see if the set contains a value</a:t>
+            </a:r>
+            <a:endParaRPr lang="en-GB" sz="1600" dirty="0"/>
+          </a:p>
+          <a:p>
+            <a:pPr marL="0" indent="0">
+              <a:buNone/>
+            </a:pPr>
+            <a:endParaRPr lang="en-GB" sz="1600" b="1" dirty="0"/>
+          </a:p>
+          <a:p>
+            <a:pPr marL="0" indent="0">
+              <a:buNone/>
+            </a:pPr>
+            <a:endParaRPr lang="en-GB" sz="1600" dirty="0"/>
           </a:p>
         </p:txBody>
       </p:sp>
     </p:spTree>
     <p:extLst>
       <p:ext uri="{BB962C8B-B14F-4D97-AF65-F5344CB8AC3E}">
-        <p14:creationId xmlns:p14="http://schemas.microsoft.com/office/powerpoint/2010/main" val="2682563385"/>
+        <p14:creationId xmlns:p14="http://schemas.microsoft.com/office/powerpoint/2010/main" val="1718666759"/>
       </p:ext>
     </p:extLst>
   </p:cSld>
@@ -3685,6 +3676,780 @@
           <a:p>
             <a:r>
               <a:rPr lang="en-US" dirty="0" smtClean="0"/>
+              <a:t>Option</a:t>
+            </a:r>
+            <a:endParaRPr lang="en-US" dirty="0"/>
+          </a:p>
+        </p:txBody>
+      </p:sp>
+      <p:sp>
+        <p:nvSpPr>
+          <p:cNvPr id="3" name="Content Placeholder 2"/>
+          <p:cNvSpPr>
+            <a:spLocks noGrp="1"/>
+          </p:cNvSpPr>
+          <p:nvPr>
+            <p:ph idx="1"/>
+          </p:nvPr>
+        </p:nvSpPr>
+        <p:spPr/>
+        <p:txBody>
+          <a:bodyPr>
+            <a:normAutofit/>
+          </a:bodyPr>
+          <a:lstStyle/>
+          <a:p>
+            <a:pPr marL="0" indent="0">
+              <a:buNone/>
+            </a:pPr>
+            <a:r>
+              <a:rPr lang="en-GB" sz="1800" b="1" dirty="0" smtClean="0"/>
+              <a:t>Algebraic Data Types (ADTs):-</a:t>
+            </a:r>
+          </a:p>
+          <a:p>
+            <a:r>
+              <a:rPr lang="en-GB" sz="1600" dirty="0" smtClean="0"/>
+              <a:t>A distinct set of possible types</a:t>
+            </a:r>
+          </a:p>
+          <a:p>
+            <a:r>
+              <a:rPr lang="en-GB" sz="1600" b="1" dirty="0" smtClean="0"/>
+              <a:t>Example :</a:t>
+            </a:r>
+            <a:r>
+              <a:rPr lang="en-GB" sz="1600" dirty="0" smtClean="0"/>
+              <a:t> </a:t>
+            </a:r>
+            <a:r>
+              <a:rPr lang="en-GB" sz="1600" dirty="0"/>
+              <a:t>D</a:t>
+            </a:r>
+            <a:r>
+              <a:rPr lang="en-GB" sz="1600" dirty="0" smtClean="0"/>
+              <a:t>ays in a week, True/False</a:t>
+            </a:r>
+          </a:p>
+          <a:p>
+            <a:endParaRPr lang="en-GB" sz="1600" dirty="0"/>
+          </a:p>
+          <a:p>
+            <a:pPr marL="0" indent="0">
+              <a:buNone/>
+            </a:pPr>
+            <a:r>
+              <a:rPr lang="en-GB" sz="1600" b="1" dirty="0" smtClean="0"/>
+              <a:t>Option:-</a:t>
+            </a:r>
+          </a:p>
+          <a:p>
+            <a:r>
+              <a:rPr lang="en-GB" sz="1600" dirty="0" smtClean="0"/>
+              <a:t>Not a collection, but a container</a:t>
+            </a:r>
+          </a:p>
+          <a:p>
+            <a:r>
+              <a:rPr lang="en-GB" sz="1600" b="1" dirty="0" smtClean="0"/>
+              <a:t>Some – </a:t>
+            </a:r>
+            <a:r>
+              <a:rPr lang="en-GB" sz="1600" dirty="0" smtClean="0"/>
+              <a:t>Representation of the value</a:t>
+            </a:r>
+          </a:p>
+          <a:p>
+            <a:r>
+              <a:rPr lang="en-GB" sz="1600" b="1" dirty="0" smtClean="0"/>
+              <a:t>None – </a:t>
+            </a:r>
+            <a:r>
+              <a:rPr lang="en-GB" sz="1600" dirty="0" smtClean="0"/>
+              <a:t>Representation of the absence of a value</a:t>
+            </a:r>
+          </a:p>
+          <a:p>
+            <a:r>
+              <a:rPr lang="en-GB" sz="1600" dirty="0" smtClean="0"/>
+              <a:t>Allows us to avoid null on the JVM</a:t>
+            </a:r>
+            <a:endParaRPr lang="en-GB" sz="1600" dirty="0"/>
+          </a:p>
+          <a:p>
+            <a:endParaRPr lang="en-GB" sz="1600" dirty="0" smtClean="0"/>
+          </a:p>
+        </p:txBody>
+      </p:sp>
+    </p:spTree>
+    <p:extLst>
+      <p:ext uri="{BB962C8B-B14F-4D97-AF65-F5344CB8AC3E}">
+        <p14:creationId xmlns:p14="http://schemas.microsoft.com/office/powerpoint/2010/main" val="963193061"/>
+      </p:ext>
+    </p:extLst>
+  </p:cSld>
+  <p:clrMapOvr>
+    <a:masterClrMapping/>
+  </p:clrMapOvr>
+  <p:timing>
+    <p:tnLst>
+      <p:par>
+        <p:cTn id="1" dur="indefinite" restart="never" nodeType="tmRoot"/>
+      </p:par>
+    </p:tnLst>
+  </p:timing>
+</p:sld>
+</file>
+
+<file path=ppt/slides/slide12.xml><?xml version="1.0" encoding="utf-8"?>
+<p:sld xmlns:a="http://schemas.openxmlformats.org/drawingml/2006/main" xmlns:r="http://schemas.openxmlformats.org/officeDocument/2006/relationships" xmlns:p="http://schemas.openxmlformats.org/presentationml/2006/main">
+  <p:cSld>
+    <p:spTree>
+      <p:nvGrpSpPr>
+        <p:cNvPr id="1" name=""/>
+        <p:cNvGrpSpPr/>
+        <p:nvPr/>
+      </p:nvGrpSpPr>
+      <p:grpSpPr>
+        <a:xfrm>
+          <a:off x="0" y="0"/>
+          <a:ext cx="0" cy="0"/>
+          <a:chOff x="0" y="0"/>
+          <a:chExt cx="0" cy="0"/>
+        </a:xfrm>
+      </p:grpSpPr>
+      <p:sp>
+        <p:nvSpPr>
+          <p:cNvPr id="2" name="Title 1"/>
+          <p:cNvSpPr>
+            <a:spLocks noGrp="1"/>
+          </p:cNvSpPr>
+          <p:nvPr>
+            <p:ph type="title"/>
+          </p:nvPr>
+        </p:nvSpPr>
+        <p:spPr/>
+        <p:txBody>
+          <a:bodyPr/>
+          <a:lstStyle/>
+          <a:p>
+            <a:r>
+              <a:rPr lang="en-US" dirty="0" smtClean="0"/>
+              <a:t>Tuples and Maps</a:t>
+            </a:r>
+            <a:endParaRPr lang="en-US" dirty="0"/>
+          </a:p>
+        </p:txBody>
+      </p:sp>
+      <p:sp>
+        <p:nvSpPr>
+          <p:cNvPr id="3" name="Content Placeholder 2"/>
+          <p:cNvSpPr>
+            <a:spLocks noGrp="1"/>
+          </p:cNvSpPr>
+          <p:nvPr>
+            <p:ph idx="1"/>
+          </p:nvPr>
+        </p:nvSpPr>
+        <p:spPr/>
+        <p:txBody>
+          <a:bodyPr>
+            <a:normAutofit/>
+          </a:bodyPr>
+          <a:lstStyle/>
+          <a:p>
+            <a:pPr marL="0" indent="0">
+              <a:buNone/>
+            </a:pPr>
+            <a:r>
+              <a:rPr lang="en-GB" sz="1800" b="1" dirty="0" smtClean="0"/>
+              <a:t>Tuples:-</a:t>
+            </a:r>
+          </a:p>
+          <a:p>
+            <a:r>
+              <a:rPr lang="en-GB" sz="1600" dirty="0" smtClean="0"/>
+              <a:t>A loose aggregation of values into a single container</a:t>
+            </a:r>
+          </a:p>
+          <a:p>
+            <a:r>
+              <a:rPr lang="en-GB" sz="1600" dirty="0" smtClean="0"/>
+              <a:t>Can have up to </a:t>
+            </a:r>
+            <a:r>
+              <a:rPr lang="en-GB" sz="1800" b="1" dirty="0" smtClean="0">
+                <a:solidFill>
+                  <a:srgbClr val="00B050"/>
+                </a:solidFill>
+              </a:rPr>
+              <a:t>22</a:t>
+            </a:r>
+            <a:r>
+              <a:rPr lang="en-GB" sz="1800" b="1" dirty="0" smtClean="0"/>
+              <a:t> </a:t>
+            </a:r>
+            <a:r>
+              <a:rPr lang="en-GB" sz="1800" b="1" dirty="0" smtClean="0">
+                <a:solidFill>
+                  <a:srgbClr val="00B050"/>
+                </a:solidFill>
+              </a:rPr>
+              <a:t>values</a:t>
+            </a:r>
+            <a:r>
+              <a:rPr lang="en-GB" sz="1800" dirty="0" smtClean="0"/>
+              <a:t> </a:t>
+            </a:r>
+            <a:r>
+              <a:rPr lang="en-GB" sz="1600" dirty="0" smtClean="0"/>
+              <a:t>in Scala </a:t>
+            </a:r>
+          </a:p>
+          <a:p>
+            <a:r>
+              <a:rPr lang="en-GB" sz="1600" dirty="0" smtClean="0"/>
+              <a:t>Can be accessed using a 1-based accessor for each value</a:t>
+            </a:r>
+          </a:p>
+          <a:p>
+            <a:pPr marL="0" indent="0">
+              <a:buNone/>
+            </a:pPr>
+            <a:endParaRPr lang="en-GB" sz="1600" dirty="0"/>
+          </a:p>
+          <a:p>
+            <a:pPr marL="0" indent="0">
+              <a:buNone/>
+            </a:pPr>
+            <a:r>
+              <a:rPr lang="en-GB" sz="1600" b="1" dirty="0" smtClean="0"/>
+              <a:t>Example:-</a:t>
+            </a:r>
+          </a:p>
+          <a:p>
+            <a:pPr marL="0" indent="0">
+              <a:buNone/>
+            </a:pPr>
+            <a:r>
+              <a:rPr lang="en-GB" sz="1600" dirty="0" err="1" smtClean="0"/>
+              <a:t>val</a:t>
+            </a:r>
+            <a:r>
+              <a:rPr lang="en-GB" sz="1600" dirty="0" smtClean="0"/>
+              <a:t> tuple = (1, “a”, 2, “b”);</a:t>
+            </a:r>
+          </a:p>
+          <a:p>
+            <a:pPr marL="0" indent="0">
+              <a:buNone/>
+            </a:pPr>
+            <a:r>
+              <a:rPr lang="en-GB" sz="1600" dirty="0" smtClean="0"/>
+              <a:t>tuple._3	</a:t>
+            </a:r>
+            <a:r>
+              <a:rPr lang="en-GB" sz="1600" dirty="0" smtClean="0">
+                <a:sym typeface="Wingdings" panose="05000000000000000000" pitchFamily="2" charset="2"/>
+              </a:rPr>
+              <a:t> will give you </a:t>
+            </a:r>
+            <a:r>
+              <a:rPr lang="en-GB" sz="1600" b="1" dirty="0" err="1" smtClean="0">
+                <a:sym typeface="Wingdings" panose="05000000000000000000" pitchFamily="2" charset="2"/>
+              </a:rPr>
+              <a:t>Int</a:t>
+            </a:r>
+            <a:r>
+              <a:rPr lang="en-GB" sz="1600" b="1" dirty="0" smtClean="0">
+                <a:sym typeface="Wingdings" panose="05000000000000000000" pitchFamily="2" charset="2"/>
+              </a:rPr>
+              <a:t> = 2</a:t>
+            </a:r>
+            <a:endParaRPr lang="en-GB" sz="1600" b="1" dirty="0" smtClean="0"/>
+          </a:p>
+          <a:p>
+            <a:pPr marL="0" indent="0">
+              <a:buNone/>
+            </a:pPr>
+            <a:endParaRPr lang="en-GB" sz="1600" dirty="0"/>
+          </a:p>
+          <a:p>
+            <a:pPr marL="0" indent="0">
+              <a:buNone/>
+            </a:pPr>
+            <a:r>
+              <a:rPr lang="en-GB" sz="1600" b="1" dirty="0" smtClean="0"/>
+              <a:t>Map:-</a:t>
+            </a:r>
+          </a:p>
+          <a:p>
+            <a:r>
+              <a:rPr lang="en-GB" sz="1600" dirty="0" smtClean="0"/>
+              <a:t>A grouping of data by key to value, which are tuple “entries”</a:t>
+            </a:r>
+          </a:p>
+          <a:p>
+            <a:r>
+              <a:rPr lang="en-GB" sz="1600" dirty="0" smtClean="0"/>
+              <a:t>Common implementations – </a:t>
+            </a:r>
+            <a:r>
+              <a:rPr lang="en-GB" sz="1600" dirty="0" err="1" smtClean="0"/>
+              <a:t>HashMap</a:t>
+            </a:r>
+            <a:r>
+              <a:rPr lang="en-GB" sz="1600" dirty="0" smtClean="0"/>
+              <a:t>, </a:t>
+            </a:r>
+            <a:r>
+              <a:rPr lang="en-GB" sz="1600" dirty="0" err="1" smtClean="0"/>
+              <a:t>TreeMap</a:t>
+            </a:r>
+            <a:endParaRPr lang="en-GB" sz="1600" dirty="0" smtClean="0"/>
+          </a:p>
+          <a:p>
+            <a:endParaRPr lang="en-GB" sz="1600" dirty="0" smtClean="0"/>
+          </a:p>
+        </p:txBody>
+      </p:sp>
+    </p:spTree>
+    <p:extLst>
+      <p:ext uri="{BB962C8B-B14F-4D97-AF65-F5344CB8AC3E}">
+        <p14:creationId xmlns:p14="http://schemas.microsoft.com/office/powerpoint/2010/main" val="1500972101"/>
+      </p:ext>
+    </p:extLst>
+  </p:cSld>
+  <p:clrMapOvr>
+    <a:masterClrMapping/>
+  </p:clrMapOvr>
+  <p:timing>
+    <p:tnLst>
+      <p:par>
+        <p:cTn id="1" dur="indefinite" restart="never" nodeType="tmRoot"/>
+      </p:par>
+    </p:tnLst>
+  </p:timing>
+</p:sld>
+</file>
+
+<file path=ppt/slides/slide13.xml><?xml version="1.0" encoding="utf-8"?>
+<p:sld xmlns:a="http://schemas.openxmlformats.org/drawingml/2006/main" xmlns:r="http://schemas.openxmlformats.org/officeDocument/2006/relationships" xmlns:p="http://schemas.openxmlformats.org/presentationml/2006/main">
+  <p:cSld>
+    <p:spTree>
+      <p:nvGrpSpPr>
+        <p:cNvPr id="1" name=""/>
+        <p:cNvGrpSpPr/>
+        <p:nvPr/>
+      </p:nvGrpSpPr>
+      <p:grpSpPr>
+        <a:xfrm>
+          <a:off x="0" y="0"/>
+          <a:ext cx="0" cy="0"/>
+          <a:chOff x="0" y="0"/>
+          <a:chExt cx="0" cy="0"/>
+        </a:xfrm>
+      </p:grpSpPr>
+      <p:sp>
+        <p:nvSpPr>
+          <p:cNvPr id="2" name="Title 1"/>
+          <p:cNvSpPr>
+            <a:spLocks noGrp="1"/>
+          </p:cNvSpPr>
+          <p:nvPr>
+            <p:ph type="title"/>
+          </p:nvPr>
+        </p:nvSpPr>
+        <p:spPr/>
+        <p:txBody>
+          <a:bodyPr/>
+          <a:lstStyle/>
+          <a:p>
+            <a:r>
+              <a:rPr lang="en-US" dirty="0" smtClean="0"/>
+              <a:t>Higher Order Functions</a:t>
+            </a:r>
+            <a:endParaRPr lang="en-US" dirty="0"/>
+          </a:p>
+        </p:txBody>
+      </p:sp>
+      <p:sp>
+        <p:nvSpPr>
+          <p:cNvPr id="3" name="Content Placeholder 2"/>
+          <p:cNvSpPr>
+            <a:spLocks noGrp="1"/>
+          </p:cNvSpPr>
+          <p:nvPr>
+            <p:ph idx="1"/>
+          </p:nvPr>
+        </p:nvSpPr>
+        <p:spPr/>
+        <p:txBody>
+          <a:bodyPr>
+            <a:normAutofit/>
+          </a:bodyPr>
+          <a:lstStyle/>
+          <a:p>
+            <a:r>
+              <a:rPr lang="en-GB" sz="1600" b="1" dirty="0" smtClean="0"/>
+              <a:t>A function </a:t>
+            </a:r>
+            <a:r>
+              <a:rPr lang="en-GB" sz="1600" dirty="0" smtClean="0"/>
+              <a:t>which takes </a:t>
+            </a:r>
+            <a:r>
+              <a:rPr lang="en-GB" sz="1600" b="1" dirty="0" smtClean="0"/>
+              <a:t>another function</a:t>
+            </a:r>
+          </a:p>
+          <a:p>
+            <a:r>
+              <a:rPr lang="en-GB" sz="1600" dirty="0" smtClean="0"/>
+              <a:t>Typically, describes the “how” for work to be done in a container</a:t>
+            </a:r>
+          </a:p>
+          <a:p>
+            <a:r>
+              <a:rPr lang="en-GB" sz="1600" dirty="0" smtClean="0"/>
+              <a:t>The function passed to it describes the “what” that should be done to elements in the container</a:t>
+            </a:r>
+          </a:p>
+          <a:p>
+            <a:r>
+              <a:rPr lang="en-GB" sz="1600" b="1" dirty="0" smtClean="0"/>
+              <a:t>Example:-</a:t>
+            </a:r>
+          </a:p>
+          <a:p>
+            <a:pPr lvl="1"/>
+            <a:r>
+              <a:rPr lang="en-GB" sz="1600" dirty="0" smtClean="0"/>
+              <a:t>res0.map(number =&gt; number + 1)</a:t>
+            </a:r>
+          </a:p>
+          <a:p>
+            <a:pPr lvl="1"/>
+            <a:r>
+              <a:rPr lang="en-GB" sz="1600" dirty="0" err="1" smtClean="0"/>
+              <a:t>flatMap</a:t>
+            </a:r>
+            <a:endParaRPr lang="en-GB" sz="1600" dirty="0" smtClean="0"/>
+          </a:p>
+          <a:p>
+            <a:pPr lvl="1"/>
+            <a:r>
+              <a:rPr lang="en-GB" sz="1600" dirty="0"/>
+              <a:t>f</a:t>
+            </a:r>
+            <a:r>
+              <a:rPr lang="en-GB" sz="1600" dirty="0" smtClean="0"/>
+              <a:t>ilter</a:t>
+            </a:r>
+          </a:p>
+          <a:p>
+            <a:pPr lvl="1"/>
+            <a:r>
+              <a:rPr lang="en-GB" sz="1600" dirty="0" err="1" smtClean="0"/>
+              <a:t>foreach</a:t>
+            </a:r>
+            <a:endParaRPr lang="en-GB" sz="1600" dirty="0" smtClean="0"/>
+          </a:p>
+          <a:p>
+            <a:pPr lvl="1"/>
+            <a:r>
+              <a:rPr lang="en-GB" sz="1600" dirty="0" smtClean="0"/>
+              <a:t>reduce</a:t>
+            </a:r>
+          </a:p>
+          <a:p>
+            <a:pPr lvl="1"/>
+            <a:r>
+              <a:rPr lang="en-GB" sz="1600" dirty="0"/>
+              <a:t>p</a:t>
+            </a:r>
+            <a:r>
+              <a:rPr lang="en-GB" sz="1600" dirty="0" smtClean="0"/>
+              <a:t>roduct</a:t>
+            </a:r>
+          </a:p>
+          <a:p>
+            <a:pPr lvl="1"/>
+            <a:r>
+              <a:rPr lang="en-GB" sz="1600" dirty="0"/>
+              <a:t>e</a:t>
+            </a:r>
+            <a:r>
+              <a:rPr lang="en-GB" sz="1600" dirty="0" smtClean="0"/>
+              <a:t>xists</a:t>
+            </a:r>
+          </a:p>
+          <a:p>
+            <a:pPr lvl="1"/>
+            <a:r>
+              <a:rPr lang="en-GB" sz="1600" dirty="0" smtClean="0"/>
+              <a:t>find</a:t>
+            </a:r>
+          </a:p>
+          <a:p>
+            <a:pPr lvl="1"/>
+            <a:r>
+              <a:rPr lang="en-GB" sz="1600" dirty="0" err="1" smtClean="0"/>
+              <a:t>groupby</a:t>
+            </a:r>
+            <a:endParaRPr lang="en-GB" sz="1600" dirty="0" smtClean="0"/>
+          </a:p>
+          <a:p>
+            <a:pPr lvl="1"/>
+            <a:r>
+              <a:rPr lang="en-GB" sz="1600" dirty="0" err="1" smtClean="0"/>
+              <a:t>takeWhile</a:t>
+            </a:r>
+            <a:r>
+              <a:rPr lang="en-GB" sz="1600" dirty="0" smtClean="0"/>
+              <a:t> and </a:t>
+            </a:r>
+            <a:r>
+              <a:rPr lang="en-GB" sz="1600" dirty="0" err="1" smtClean="0"/>
+              <a:t>dropWhile</a:t>
+            </a:r>
+            <a:endParaRPr lang="en-GB" sz="1600" dirty="0" smtClean="0"/>
+          </a:p>
+        </p:txBody>
+      </p:sp>
+    </p:spTree>
+    <p:extLst>
+      <p:ext uri="{BB962C8B-B14F-4D97-AF65-F5344CB8AC3E}">
+        <p14:creationId xmlns:p14="http://schemas.microsoft.com/office/powerpoint/2010/main" val="2682563385"/>
+      </p:ext>
+    </p:extLst>
+  </p:cSld>
+  <p:clrMapOvr>
+    <a:masterClrMapping/>
+  </p:clrMapOvr>
+  <p:timing>
+    <p:tnLst>
+      <p:par>
+        <p:cTn id="1" dur="indefinite" restart="never" nodeType="tmRoot"/>
+      </p:par>
+    </p:tnLst>
+  </p:timing>
+</p:sld>
+</file>
+
+<file path=ppt/slides/slide14.xml><?xml version="1.0" encoding="utf-8"?>
+<p:sld xmlns:a="http://schemas.openxmlformats.org/drawingml/2006/main" xmlns:r="http://schemas.openxmlformats.org/officeDocument/2006/relationships" xmlns:p="http://schemas.openxmlformats.org/presentationml/2006/main">
+  <p:cSld>
+    <p:spTree>
+      <p:nvGrpSpPr>
+        <p:cNvPr id="1" name=""/>
+        <p:cNvGrpSpPr/>
+        <p:nvPr/>
+      </p:nvGrpSpPr>
+      <p:grpSpPr>
+        <a:xfrm>
+          <a:off x="0" y="0"/>
+          <a:ext cx="0" cy="0"/>
+          <a:chOff x="0" y="0"/>
+          <a:chExt cx="0" cy="0"/>
+        </a:xfrm>
+      </p:grpSpPr>
+      <p:sp>
+        <p:nvSpPr>
+          <p:cNvPr id="2" name="Title 1"/>
+          <p:cNvSpPr>
+            <a:spLocks noGrp="1"/>
+          </p:cNvSpPr>
+          <p:nvPr>
+            <p:ph type="title"/>
+          </p:nvPr>
+        </p:nvSpPr>
+        <p:spPr/>
+        <p:txBody>
+          <a:bodyPr/>
+          <a:lstStyle/>
+          <a:p>
+            <a:r>
+              <a:rPr lang="en-US" dirty="0" smtClean="0"/>
+              <a:t>Infix Notations</a:t>
+            </a:r>
+            <a:endParaRPr lang="en-US" dirty="0"/>
+          </a:p>
+        </p:txBody>
+      </p:sp>
+      <p:sp>
+        <p:nvSpPr>
+          <p:cNvPr id="3" name="Content Placeholder 2"/>
+          <p:cNvSpPr>
+            <a:spLocks noGrp="1"/>
+          </p:cNvSpPr>
+          <p:nvPr>
+            <p:ph idx="1"/>
+          </p:nvPr>
+        </p:nvSpPr>
+        <p:spPr/>
+        <p:txBody>
+          <a:bodyPr>
+            <a:normAutofit/>
+          </a:bodyPr>
+          <a:lstStyle/>
+          <a:p>
+            <a:r>
+              <a:rPr lang="en-GB" sz="1600" dirty="0" smtClean="0"/>
+              <a:t>The method can be called without using the Dot operator</a:t>
+            </a:r>
+          </a:p>
+          <a:p>
+            <a:r>
+              <a:rPr lang="en-GB" sz="1600" dirty="0"/>
+              <a:t>Scala has a special </a:t>
+            </a:r>
+            <a:r>
+              <a:rPr lang="en-GB" sz="1600" b="1" dirty="0"/>
+              <a:t>punctuation-free</a:t>
+            </a:r>
+            <a:r>
+              <a:rPr lang="en-GB" sz="1600" dirty="0"/>
+              <a:t> syntax for invoking methods that take </a:t>
+            </a:r>
+            <a:r>
+              <a:rPr lang="en-GB" sz="1600" b="1" dirty="0"/>
+              <a:t>one argument</a:t>
+            </a:r>
+            <a:r>
+              <a:rPr lang="en-GB" sz="1600" dirty="0"/>
+              <a:t>. Many Scala programmers use this notation for symbolic-named methods</a:t>
+            </a:r>
+            <a:r>
+              <a:rPr lang="en-GB" sz="1600" dirty="0" smtClean="0"/>
+              <a:t>:</a:t>
+            </a:r>
+          </a:p>
+          <a:p>
+            <a:r>
+              <a:rPr lang="en-GB" sz="1600" dirty="0" smtClean="0"/>
+              <a:t>Example:-</a:t>
+            </a:r>
+          </a:p>
+          <a:p>
+            <a:endParaRPr lang="en-GB" sz="1600" dirty="0"/>
+          </a:p>
+          <a:p>
+            <a:endParaRPr lang="en-GB" sz="1600" dirty="0" smtClean="0"/>
+          </a:p>
+          <a:p>
+            <a:endParaRPr lang="en-GB" sz="1600" dirty="0" smtClean="0"/>
+          </a:p>
+        </p:txBody>
+      </p:sp>
+      <p:pic>
+        <p:nvPicPr>
+          <p:cNvPr id="1026" name="Picture 2"/>
+          <p:cNvPicPr>
+            <a:picLocks noChangeAspect="1" noChangeArrowheads="1"/>
+          </p:cNvPicPr>
+          <p:nvPr/>
+        </p:nvPicPr>
+        <p:blipFill>
+          <a:blip r:embed="rId2">
+            <a:extLst>
+              <a:ext uri="{28A0092B-C50C-407E-A947-70E740481C1C}">
+                <a14:useLocalDpi xmlns:a14="http://schemas.microsoft.com/office/drawing/2010/main" val="0"/>
+              </a:ext>
+            </a:extLst>
+          </a:blip>
+          <a:srcRect/>
+          <a:stretch>
+            <a:fillRect/>
+          </a:stretch>
+        </p:blipFill>
+        <p:spPr bwMode="auto">
+          <a:xfrm>
+            <a:off x="827584" y="3068960"/>
+            <a:ext cx="3067050" cy="1714500"/>
+          </a:xfrm>
+          <a:prstGeom prst="rect">
+            <a:avLst/>
+          </a:prstGeom>
+          <a:noFill/>
+          <a:ln>
+            <a:noFill/>
+          </a:ln>
+          <a:extLst>
+            <a:ext uri="{909E8E84-426E-40DD-AFC4-6F175D3DCCD1}">
+              <a14:hiddenFill xmlns:a14="http://schemas.microsoft.com/office/drawing/2010/main">
+                <a:solidFill>
+                  <a:schemeClr val="accent1"/>
+                </a:solidFill>
+              </a14:hiddenFill>
+            </a:ext>
+            <a:ext uri="{91240B29-F687-4F45-9708-019B960494DF}">
+              <a14:hiddenLine xmlns:a14="http://schemas.microsoft.com/office/drawing/2010/main" w="9525">
+                <a:solidFill>
+                  <a:schemeClr val="tx1"/>
+                </a:solidFill>
+                <a:miter lim="800000"/>
+                <a:headEnd/>
+                <a:tailEnd/>
+              </a14:hiddenLine>
+            </a:ext>
+          </a:extLst>
+        </p:spPr>
+      </p:pic>
+    </p:spTree>
+    <p:extLst>
+      <p:ext uri="{BB962C8B-B14F-4D97-AF65-F5344CB8AC3E}">
+        <p14:creationId xmlns:p14="http://schemas.microsoft.com/office/powerpoint/2010/main" val="847992720"/>
+      </p:ext>
+    </p:extLst>
+  </p:cSld>
+  <p:clrMapOvr>
+    <a:masterClrMapping/>
+  </p:clrMapOvr>
+  <p:timing>
+    <p:tnLst>
+      <p:par>
+        <p:cTn id="1" dur="indefinite" restart="never" nodeType="tmRoot"/>
+      </p:par>
+    </p:tnLst>
+  </p:timing>
+</p:sld>
+</file>
+
+<file path=ppt/slides/slide15.xml><?xml version="1.0" encoding="utf-8"?>
+<p:sld xmlns:a="http://schemas.openxmlformats.org/drawingml/2006/main" xmlns:r="http://schemas.openxmlformats.org/officeDocument/2006/relationships" xmlns:p="http://schemas.openxmlformats.org/presentationml/2006/main">
+  <p:cSld>
+    <p:spTree>
+      <p:nvGrpSpPr>
+        <p:cNvPr id="1" name=""/>
+        <p:cNvGrpSpPr/>
+        <p:nvPr/>
+      </p:nvGrpSpPr>
+      <p:grpSpPr>
+        <a:xfrm>
+          <a:off x="0" y="0"/>
+          <a:ext cx="0" cy="0"/>
+          <a:chOff x="0" y="0"/>
+          <a:chExt cx="0" cy="0"/>
+        </a:xfrm>
+      </p:grpSpPr>
+      <p:sp>
+        <p:nvSpPr>
+          <p:cNvPr id="2" name="Title 1"/>
+          <p:cNvSpPr>
+            <a:spLocks noGrp="1"/>
+          </p:cNvSpPr>
+          <p:nvPr>
+            <p:ph type="title"/>
+          </p:nvPr>
+        </p:nvSpPr>
+        <p:spPr/>
+        <p:txBody>
+          <a:bodyPr/>
+          <a:lstStyle/>
+          <a:p>
+            <a:r>
+              <a:rPr lang="en-US" dirty="0" smtClean="0"/>
               <a:t>References</a:t>
             </a:r>
             <a:endParaRPr lang="en-US" dirty="0"/>
@@ -3719,6 +4484,28 @@
                 <a:hlinkClick r:id="rId2"/>
               </a:rPr>
               <a:t>/</a:t>
+            </a:r>
+            <a:endParaRPr lang="en-US" sz="1600" dirty="0" smtClean="0"/>
+          </a:p>
+          <a:p>
+            <a:r>
+              <a:rPr lang="en-US" sz="1600" dirty="0">
+                <a:hlinkClick r:id="rId3"/>
+              </a:rPr>
+              <a:t>http://</a:t>
+            </a:r>
+            <a:r>
+              <a:rPr lang="en-US" sz="1600" dirty="0" smtClean="0">
+                <a:hlinkClick r:id="rId3"/>
+              </a:rPr>
+              <a:t>alvinalexander.com/scala/how-to-create-scala-object-instances-without-new-apply-case-class</a:t>
+            </a:r>
+            <a:endParaRPr lang="en-US" sz="1600" dirty="0" smtClean="0"/>
+          </a:p>
+          <a:p>
+            <a:r>
+              <a:rPr lang="en-US" sz="1600"/>
+              <a:t>http://joelabrahamsson.com/learning-scala-part-four-classes-and-constructors/</a:t>
             </a:r>
             <a:endParaRPr lang="en-US" sz="1600" dirty="0" smtClean="0"/>
           </a:p>
@@ -3781,7 +4568,7 @@
           <a:p>
             <a:r>
               <a:rPr lang="en-US" dirty="0" smtClean="0"/>
-              <a:t>Scala – Companion Objects</a:t>
+              <a:t>Scala – Class</a:t>
             </a:r>
             <a:endParaRPr lang="en-US" dirty="0"/>
           </a:p>
@@ -3806,166 +4593,161 @@
           <a:p>
             <a:r>
               <a:rPr lang="en-GB" sz="1600" dirty="0" smtClean="0"/>
-              <a:t>If a Singleton object and a class share the </a:t>
+              <a:t>The Scala object can be created </a:t>
+            </a:r>
+            <a:r>
+              <a:rPr lang="en-GB" sz="1600" b="1" dirty="0" smtClean="0">
+                <a:solidFill>
+                  <a:srgbClr val="00B050"/>
+                </a:solidFill>
+              </a:rPr>
+              <a:t>without using the new operator</a:t>
+            </a:r>
+            <a:r>
+              <a:rPr lang="en-GB" sz="1600" dirty="0" smtClean="0"/>
+              <a:t> as well</a:t>
+            </a:r>
+          </a:p>
+          <a:p>
+            <a:r>
+              <a:rPr lang="en-GB" sz="1600" dirty="0"/>
+              <a:t>There are two ways to do this</a:t>
+            </a:r>
+            <a:r>
+              <a:rPr lang="en-GB" sz="1600" dirty="0" smtClean="0"/>
+              <a:t>:-</a:t>
+            </a:r>
+          </a:p>
+          <a:p>
+            <a:pPr marL="0" indent="0">
+              <a:buNone/>
+            </a:pPr>
+            <a:endParaRPr lang="en-GB" sz="1600" dirty="0" smtClean="0"/>
+          </a:p>
+          <a:p>
+            <a:pPr marL="342900" indent="-342900">
+              <a:buFont typeface="+mj-lt"/>
+              <a:buAutoNum type="arabicPeriod"/>
+            </a:pPr>
+            <a:r>
+              <a:rPr lang="en-GB" sz="1600" dirty="0"/>
+              <a:t>Create a</a:t>
+            </a:r>
+            <a:r>
+              <a:rPr lang="en-GB" sz="1600" b="1" dirty="0"/>
+              <a:t> companion object</a:t>
+            </a:r>
+            <a:r>
+              <a:rPr lang="en-GB" sz="1600" dirty="0"/>
+              <a:t> for your class, and define an apply method in the companion object with the desired constructor signature.</a:t>
+            </a:r>
+          </a:p>
+          <a:p>
+            <a:pPr marL="342900" indent="-342900">
+              <a:buFont typeface="+mj-lt"/>
+              <a:buAutoNum type="arabicPeriod"/>
+            </a:pPr>
+            <a:r>
+              <a:rPr lang="en-GB" sz="1600" dirty="0"/>
+              <a:t>Define your class as a </a:t>
+            </a:r>
+            <a:r>
+              <a:rPr lang="en-GB" sz="1600" b="1" dirty="0"/>
+              <a:t>“case class</a:t>
             </a:r>
             <a:r>
               <a:rPr lang="en-GB" sz="1600" b="1" dirty="0" smtClean="0"/>
-              <a:t>same name </a:t>
-            </a:r>
-            <a:r>
-              <a:rPr lang="en-GB" sz="1600" dirty="0" smtClean="0"/>
-              <a:t>and are located in the </a:t>
+              <a:t>.”</a:t>
+            </a:r>
+          </a:p>
+          <a:p>
+            <a:pPr marL="0" indent="0">
+              <a:buNone/>
+            </a:pPr>
+            <a:endParaRPr lang="en-GB" sz="1600" b="1" dirty="0"/>
+          </a:p>
+          <a:p>
+            <a:pPr marL="0" indent="0">
+              <a:buNone/>
+            </a:pPr>
+            <a:r>
+              <a:rPr lang="en-GB" sz="1600" b="1" dirty="0"/>
+              <a:t>Creating a companion object with an </a:t>
             </a:r>
             <a:r>
               <a:rPr lang="en-GB" sz="1600" b="1" dirty="0" smtClean="0"/>
-              <a:t>same source file</a:t>
-            </a:r>
-            <a:r>
-              <a:rPr lang="en-GB" sz="1600" dirty="0" smtClean="0"/>
-              <a:t>, they are called companions</a:t>
-            </a:r>
-          </a:p>
-          <a:p>
-            <a:r>
-              <a:rPr lang="en-GB" sz="1600" dirty="0" smtClean="0"/>
-              <a:t>A companion class can access private fields and methods inside of its companion object</a:t>
+              <a:t>“apply” </a:t>
+            </a:r>
+            <a:r>
+              <a:rPr lang="en-GB" sz="1600" b="1" dirty="0"/>
+              <a:t>method</a:t>
             </a:r>
           </a:p>
           <a:p>
             <a:pPr marL="0" indent="0">
               <a:buNone/>
             </a:pPr>
-            <a:endParaRPr lang="en-GB" sz="1600" dirty="0"/>
-          </a:p>
-          <a:p>
-            <a:pPr marL="0" indent="0">
-              <a:buNone/>
-            </a:pPr>
-            <a:r>
-              <a:rPr lang="en-GB" sz="1600" b="1" dirty="0" smtClean="0"/>
-              <a:t>Example:-</a:t>
-            </a:r>
-          </a:p>
-          <a:p>
-            <a:pPr marL="0" indent="0">
-              <a:buNone/>
-            </a:pPr>
-            <a:endParaRPr lang="en-GB" sz="1600" dirty="0"/>
-          </a:p>
-          <a:p>
-            <a:pPr marL="0" indent="0">
-              <a:buNone/>
-            </a:pPr>
-            <a:r>
-              <a:rPr lang="en-GB" sz="1600" dirty="0" smtClean="0"/>
-              <a:t>object </a:t>
-            </a:r>
-            <a:r>
-              <a:rPr lang="en-GB" sz="1600" b="1" dirty="0" smtClean="0"/>
-              <a:t>Hello</a:t>
-            </a:r>
-            <a:r>
-              <a:rPr lang="en-GB" sz="1600" dirty="0" smtClean="0"/>
-              <a:t> {</a:t>
-            </a:r>
-          </a:p>
-          <a:p>
-            <a:pPr marL="0" indent="0">
-              <a:buNone/>
-            </a:pPr>
-            <a:r>
-              <a:rPr lang="en-GB" sz="1600" dirty="0"/>
-              <a:t>	</a:t>
-            </a:r>
-            <a:r>
-              <a:rPr lang="en-GB" sz="1600" dirty="0" smtClean="0"/>
-              <a:t>private </a:t>
-            </a:r>
-            <a:r>
-              <a:rPr lang="en-GB" sz="1600" dirty="0" err="1" smtClean="0"/>
-              <a:t>val</a:t>
-            </a:r>
-            <a:r>
-              <a:rPr lang="en-GB" sz="1600" dirty="0" smtClean="0"/>
-              <a:t> </a:t>
-            </a:r>
-            <a:r>
-              <a:rPr lang="en-GB" sz="1600" dirty="0" err="1" smtClean="0"/>
-              <a:t>defaultMessage</a:t>
-            </a:r>
-            <a:r>
-              <a:rPr lang="en-GB" sz="1600" dirty="0" smtClean="0"/>
-              <a:t> = “Hello!”</a:t>
-            </a:r>
-          </a:p>
-          <a:p>
-            <a:pPr marL="0" indent="0">
-              <a:buNone/>
-            </a:pPr>
-            <a:r>
-              <a:rPr lang="en-GB" sz="1600" dirty="0" smtClean="0"/>
-              <a:t>}</a:t>
-            </a:r>
-          </a:p>
-          <a:p>
-            <a:pPr marL="0" indent="0">
-              <a:buNone/>
-            </a:pPr>
-            <a:endParaRPr lang="en-GB" sz="1400" dirty="0" smtClean="0"/>
-          </a:p>
-          <a:p>
-            <a:pPr marL="0" indent="0">
-              <a:buNone/>
-            </a:pPr>
-            <a:r>
-              <a:rPr lang="en-GB" sz="1400" dirty="0" smtClean="0"/>
-              <a:t>class </a:t>
-            </a:r>
-            <a:r>
-              <a:rPr lang="en-GB" sz="1400" b="1" dirty="0" smtClean="0"/>
-              <a:t>Hello</a:t>
-            </a:r>
-            <a:r>
-              <a:rPr lang="en-GB" sz="1400" dirty="0" smtClean="0"/>
-              <a:t> (message : String = </a:t>
-            </a:r>
-            <a:r>
-              <a:rPr lang="en-GB" sz="1400" dirty="0" err="1" smtClean="0"/>
-              <a:t>Hello.defaultMessage</a:t>
-            </a:r>
-            <a:r>
-              <a:rPr lang="en-GB" sz="1400" dirty="0" smtClean="0"/>
-              <a:t>) {</a:t>
-            </a:r>
-          </a:p>
-          <a:p>
-            <a:pPr marL="0" indent="0">
-              <a:buNone/>
-            </a:pPr>
-            <a:r>
-              <a:rPr lang="en-GB" sz="1400" dirty="0"/>
-              <a:t>	</a:t>
-            </a:r>
-            <a:r>
-              <a:rPr lang="en-GB" sz="1400" dirty="0" err="1" smtClean="0"/>
-              <a:t>println</a:t>
-            </a:r>
-            <a:r>
-              <a:rPr lang="en-GB" sz="1400" dirty="0" smtClean="0"/>
-              <a:t> (message)</a:t>
-            </a:r>
-          </a:p>
-          <a:p>
-            <a:pPr marL="0" indent="0">
-              <a:buNone/>
-            </a:pPr>
-            <a:r>
-              <a:rPr lang="en-GB" sz="1400" dirty="0"/>
-              <a:t>}</a:t>
-            </a:r>
-          </a:p>
-        </p:txBody>
-      </p:sp>
+            <a:endParaRPr lang="en-GB" sz="1600" b="1" dirty="0"/>
+          </a:p>
+          <a:p>
+            <a:endParaRPr lang="en-GB" sz="1400" dirty="0"/>
+          </a:p>
+        </p:txBody>
+      </p:sp>
+      <p:pic>
+        <p:nvPicPr>
+          <p:cNvPr id="2050" name="Picture 2"/>
+          <p:cNvPicPr>
+            <a:picLocks noChangeAspect="1" noChangeArrowheads="1"/>
+          </p:cNvPicPr>
+          <p:nvPr/>
+        </p:nvPicPr>
+        <p:blipFill>
+          <a:blip r:embed="rId2">
+            <a:extLst>
+              <a:ext uri="{28A0092B-C50C-407E-A947-70E740481C1C}">
+                <a14:useLocalDpi xmlns:a14="http://schemas.microsoft.com/office/drawing/2010/main" val="0"/>
+              </a:ext>
+            </a:extLst>
+          </a:blip>
+          <a:srcRect/>
+          <a:stretch>
+            <a:fillRect/>
+          </a:stretch>
+        </p:blipFill>
+        <p:spPr bwMode="auto">
+          <a:xfrm>
+            <a:off x="827584" y="4077072"/>
+            <a:ext cx="3543300" cy="2447925"/>
+          </a:xfrm>
+          <a:prstGeom prst="rect">
+            <a:avLst/>
+          </a:prstGeom>
+          <a:noFill/>
+          <a:ln>
+            <a:noFill/>
+          </a:ln>
+          <a:extLst>
+            <a:ext uri="{909E8E84-426E-40DD-AFC4-6F175D3DCCD1}">
+              <a14:hiddenFill xmlns:a14="http://schemas.microsoft.com/office/drawing/2010/main">
+                <a:solidFill>
+                  <a:schemeClr val="accent1"/>
+                </a:solidFill>
+              </a14:hiddenFill>
+            </a:ext>
+            <a:ext uri="{91240B29-F687-4F45-9708-019B960494DF}">
+              <a14:hiddenLine xmlns:a14="http://schemas.microsoft.com/office/drawing/2010/main" w="9525">
+                <a:solidFill>
+                  <a:schemeClr val="tx1"/>
+                </a:solidFill>
+                <a:miter lim="800000"/>
+                <a:headEnd/>
+                <a:tailEnd/>
+              </a14:hiddenLine>
+            </a:ext>
+          </a:extLst>
+        </p:spPr>
+      </p:pic>
     </p:spTree>
     <p:extLst>
       <p:ext uri="{BB962C8B-B14F-4D97-AF65-F5344CB8AC3E}">
@@ -4020,7 +4802,7 @@
           <a:p>
             <a:r>
               <a:rPr lang="en-US" dirty="0" smtClean="0"/>
-              <a:t>Scala – Case Classes &amp; Objects</a:t>
+              <a:t>Scala – Class (Continues …)</a:t>
             </a:r>
             <a:endParaRPr lang="en-US" dirty="0"/>
           </a:p>
@@ -4044,113 +4826,123 @@
           <a:lstStyle/>
           <a:p>
             <a:r>
-              <a:rPr lang="en-GB" sz="1600" b="1" dirty="0" smtClean="0"/>
-              <a:t>Case Class:-</a:t>
-            </a:r>
-          </a:p>
-          <a:p>
-            <a:pPr lvl="1"/>
-            <a:r>
-              <a:rPr lang="en-GB" sz="1400" dirty="0" smtClean="0"/>
-              <a:t>Generates JVM-specific convenience methods</a:t>
-            </a:r>
-          </a:p>
-          <a:p>
-            <a:pPr lvl="1"/>
-            <a:r>
-              <a:rPr lang="en-GB" sz="1400" dirty="0" smtClean="0"/>
-              <a:t>Makes every class parameter a </a:t>
-            </a:r>
-            <a:r>
-              <a:rPr lang="en-GB" sz="1400" b="1" dirty="0" smtClean="0"/>
-              <a:t>field </a:t>
-            </a:r>
-            <a:r>
-              <a:rPr lang="en-GB" sz="1400" dirty="0" smtClean="0"/>
-              <a:t>(field means – it is basically an instance field)</a:t>
-            </a:r>
-          </a:p>
-          <a:p>
-            <a:pPr lvl="1"/>
-            <a:r>
-              <a:rPr lang="en-GB" sz="1400" b="1" dirty="0" smtClean="0"/>
-              <a:t>Immutable</a:t>
-            </a:r>
-            <a:r>
-              <a:rPr lang="en-GB" sz="1400" dirty="0" smtClean="0"/>
-              <a:t> by default</a:t>
-            </a:r>
-          </a:p>
-          <a:p>
-            <a:pPr lvl="1"/>
-            <a:r>
-              <a:rPr lang="en-GB" sz="1400" dirty="0" smtClean="0"/>
-              <a:t>Performs value-based equivalent by default (rather than checking the object instances to determine whether they are equal)</a:t>
-            </a:r>
-          </a:p>
-          <a:p>
-            <a:pPr lvl="1"/>
-            <a:endParaRPr lang="en-GB" sz="1000" b="1" dirty="0" smtClean="0"/>
-          </a:p>
-          <a:p>
-            <a:r>
-              <a:rPr lang="en-GB" sz="1600" b="1" dirty="0"/>
-              <a:t>Case </a:t>
-            </a:r>
-            <a:r>
-              <a:rPr lang="en-GB" sz="1600" b="1" dirty="0" smtClean="0"/>
-              <a:t>Object:-</a:t>
-            </a:r>
-          </a:p>
-          <a:p>
-            <a:pPr lvl="1"/>
-            <a:r>
-              <a:rPr lang="en-GB" sz="1400" dirty="0" smtClean="0"/>
-              <a:t>If a case class is an instance-based representation of a data type, a case object is a representation of a data type of which there can only be a </a:t>
-            </a:r>
-            <a:r>
-              <a:rPr lang="en-GB" sz="1400" b="1" dirty="0" smtClean="0"/>
-              <a:t>single instance</a:t>
-            </a:r>
-          </a:p>
-          <a:p>
-            <a:pPr lvl="1"/>
-            <a:r>
-              <a:rPr lang="en-GB" sz="1400" dirty="0" smtClean="0"/>
-              <a:t>If you try to create a case class with </a:t>
-            </a:r>
-            <a:r>
-              <a:rPr lang="en-GB" sz="1400" b="1" dirty="0" smtClean="0">
+              <a:rPr lang="en-GB" sz="1600" dirty="0" smtClean="0"/>
+              <a:t>Parameters can be passed to the Scala class </a:t>
+            </a:r>
+          </a:p>
+          <a:p>
+            <a:r>
+              <a:rPr lang="en-GB" sz="1600" dirty="0" smtClean="0"/>
+              <a:t>Any statements that needs to be executed while creating the object can be coded inside the class body</a:t>
+            </a:r>
+          </a:p>
+          <a:p>
+            <a:endParaRPr lang="en-GB" sz="1600" dirty="0"/>
+          </a:p>
+          <a:p>
+            <a:endParaRPr lang="en-GB" sz="1600" dirty="0" smtClean="0"/>
+          </a:p>
+          <a:p>
+            <a:endParaRPr lang="en-GB" sz="1600" dirty="0"/>
+          </a:p>
+          <a:p>
+            <a:endParaRPr lang="en-GB" sz="1600" dirty="0" smtClean="0"/>
+          </a:p>
+          <a:p>
+            <a:endParaRPr lang="en-GB" sz="1600" dirty="0"/>
+          </a:p>
+          <a:p>
+            <a:endParaRPr lang="en-GB" sz="1600" dirty="0" smtClean="0"/>
+          </a:p>
+          <a:p>
+            <a:endParaRPr lang="en-GB" sz="1600" dirty="0"/>
+          </a:p>
+          <a:p>
+            <a:endParaRPr lang="en-GB" sz="1600" dirty="0" smtClean="0"/>
+          </a:p>
+          <a:p>
+            <a:r>
+              <a:rPr lang="en-GB" sz="1600" b="1" dirty="0" smtClean="0">
                 <a:solidFill>
-                  <a:srgbClr val="FF0000"/>
+                  <a:srgbClr val="00B050"/>
                 </a:solidFill>
               </a:rPr>
-              <a:t>no</a:t>
-            </a:r>
-            <a:r>
-              <a:rPr lang="en-GB" sz="1400" dirty="0" smtClean="0"/>
-              <a:t> parameters, it is </a:t>
-            </a:r>
-            <a:r>
-              <a:rPr lang="en-GB" sz="1400" b="1" dirty="0" smtClean="0"/>
-              <a:t>stateless </a:t>
-            </a:r>
-            <a:r>
-              <a:rPr lang="en-GB" sz="1400" dirty="0" smtClean="0"/>
-              <a:t>and should be a case object</a:t>
-            </a:r>
-            <a:endParaRPr lang="en-GB" sz="1400" b="1" dirty="0"/>
-          </a:p>
-          <a:p>
-            <a:pPr lvl="1"/>
-            <a:endParaRPr lang="en-GB" sz="1000" b="1" dirty="0"/>
-          </a:p>
-        </p:txBody>
-      </p:sp>
+              <a:t>Unit</a:t>
+            </a:r>
+            <a:r>
+              <a:rPr lang="en-GB" sz="1600" dirty="0" smtClean="0"/>
+              <a:t> is the equivalent of </a:t>
+            </a:r>
+            <a:r>
+              <a:rPr lang="en-GB" sz="1600" b="1" dirty="0" smtClean="0"/>
+              <a:t>void</a:t>
+            </a:r>
+            <a:r>
+              <a:rPr lang="en-GB" sz="1600" dirty="0" smtClean="0"/>
+              <a:t> in Java</a:t>
+            </a:r>
+            <a:endParaRPr lang="en-GB" sz="1600" dirty="0"/>
+          </a:p>
+        </p:txBody>
+      </p:sp>
+      <p:pic>
+        <p:nvPicPr>
+          <p:cNvPr id="1026" name="Picture 2"/>
+          <p:cNvPicPr>
+            <a:picLocks noChangeAspect="1" noChangeArrowheads="1"/>
+          </p:cNvPicPr>
+          <p:nvPr/>
+        </p:nvPicPr>
+        <p:blipFill>
+          <a:blip r:embed="rId2">
+            <a:extLst>
+              <a:ext uri="{28A0092B-C50C-407E-A947-70E740481C1C}">
+                <a14:useLocalDpi xmlns:a14="http://schemas.microsoft.com/office/drawing/2010/main" val="0"/>
+              </a:ext>
+            </a:extLst>
+          </a:blip>
+          <a:srcRect/>
+          <a:stretch>
+            <a:fillRect/>
+          </a:stretch>
+        </p:blipFill>
+        <p:spPr bwMode="auto">
+          <a:xfrm>
+            <a:off x="827584" y="2708920"/>
+            <a:ext cx="4286250" cy="1895475"/>
+          </a:xfrm>
+          <a:prstGeom prst="rect">
+            <a:avLst/>
+          </a:prstGeom>
+          <a:noFill/>
+          <a:ln>
+            <a:noFill/>
+          </a:ln>
+          <a:extLst>
+            <a:ext uri="{909E8E84-426E-40DD-AFC4-6F175D3DCCD1}">
+              <a14:hiddenFill xmlns:a14="http://schemas.microsoft.com/office/drawing/2010/main">
+                <a:solidFill>
+                  <a:schemeClr val="accent1"/>
+                </a:solidFill>
+              </a14:hiddenFill>
+            </a:ext>
+            <a:ext uri="{91240B29-F687-4F45-9708-019B960494DF}">
+              <a14:hiddenLine xmlns:a14="http://schemas.microsoft.com/office/drawing/2010/main" w="9525">
+                <a:solidFill>
+                  <a:schemeClr val="tx1"/>
+                </a:solidFill>
+                <a:miter lim="800000"/>
+                <a:headEnd/>
+                <a:tailEnd/>
+              </a14:hiddenLine>
+            </a:ext>
+          </a:extLst>
+        </p:spPr>
+      </p:pic>
     </p:spTree>
     <p:extLst>
       <p:ext uri="{BB962C8B-B14F-4D97-AF65-F5344CB8AC3E}">
-        <p14:creationId xmlns:p14="http://schemas.microsoft.com/office/powerpoint/2010/main" val="3381182667"/>
+        <p14:creationId xmlns:p14="http://schemas.microsoft.com/office/powerpoint/2010/main" val="2857180295"/>
       </p:ext>
     </p:extLst>
   </p:cSld>
@@ -4201,7 +4993,7 @@
           <a:p>
             <a:r>
               <a:rPr lang="en-US" dirty="0" smtClean="0"/>
-              <a:t>Scala – Apply and UnApply</a:t>
+              <a:t>Scala – Companion Objects</a:t>
             </a:r>
             <a:endParaRPr lang="en-US" dirty="0"/>
           </a:p>
@@ -4225,104 +5017,171 @@
           <a:lstStyle/>
           <a:p>
             <a:r>
+              <a:rPr lang="en-GB" sz="1600" dirty="0" smtClean="0"/>
+              <a:t>If a Singleton object and a class share the </a:t>
+            </a:r>
+            <a:r>
               <a:rPr lang="en-GB" sz="1600" b="1" dirty="0" smtClean="0"/>
-              <a:t>case class Time(hours : </a:t>
-            </a:r>
-            <a:r>
-              <a:rPr lang="en-GB" sz="1600" b="1" dirty="0" err="1" smtClean="0"/>
-              <a:t>Int</a:t>
+              <a:t>same name </a:t>
+            </a:r>
+            <a:r>
+              <a:rPr lang="en-GB" sz="1600" dirty="0" smtClean="0"/>
+              <a:t>and are located in the </a:t>
             </a:r>
             <a:r>
               <a:rPr lang="en-GB" sz="1600" b="1" dirty="0" smtClean="0"/>
-              <a:t> = 0, minutes: </a:t>
-            </a:r>
-            <a:r>
-              <a:rPr lang="en-GB" sz="1600" b="1" dirty="0" err="1" smtClean="0"/>
-              <a:t>Int</a:t>
-            </a:r>
+              <a:t>same source file</a:t>
+            </a:r>
+            <a:r>
+              <a:rPr lang="en-GB" sz="1600" dirty="0" smtClean="0"/>
+              <a:t>, they are called companions</a:t>
+            </a:r>
+          </a:p>
+          <a:p>
+            <a:r>
+              <a:rPr lang="en-GB" sz="1600" dirty="0" smtClean="0"/>
+              <a:t>A companion class can access private fields and methods inside of its companion object</a:t>
+            </a:r>
+          </a:p>
+          <a:p>
+            <a:pPr marL="0" indent="0">
+              <a:buNone/>
+            </a:pPr>
+            <a:endParaRPr lang="en-GB" sz="1600" dirty="0"/>
+          </a:p>
+          <a:p>
+            <a:pPr marL="0" indent="0">
+              <a:buNone/>
+            </a:pPr>
             <a:r>
               <a:rPr lang="en-GB" sz="1600" b="1" dirty="0" smtClean="0"/>
-              <a:t> = 0)</a:t>
-            </a:r>
-          </a:p>
-          <a:p>
-            <a:r>
-              <a:rPr lang="en-GB" sz="1600" b="1" dirty="0" err="1" smtClean="0"/>
+              <a:t>Example:-</a:t>
+            </a:r>
+          </a:p>
+          <a:p>
+            <a:pPr marL="0" indent="0">
+              <a:buNone/>
+            </a:pPr>
+            <a:endParaRPr lang="en-GB" sz="1600" dirty="0"/>
+          </a:p>
+          <a:p>
+            <a:pPr marL="0" indent="0">
+              <a:buNone/>
+            </a:pPr>
+            <a:r>
+              <a:rPr lang="en-GB" sz="1600" dirty="0" smtClean="0"/>
+              <a:t>object </a:t>
+            </a:r>
+            <a:r>
+              <a:rPr lang="en-GB" sz="1600" b="1" dirty="0" smtClean="0"/>
+              <a:t>Hello</a:t>
+            </a:r>
+            <a:r>
+              <a:rPr lang="en-GB" sz="1600" dirty="0" smtClean="0"/>
+              <a:t> {</a:t>
+            </a:r>
+          </a:p>
+          <a:p>
+            <a:pPr marL="0" indent="0">
+              <a:buNone/>
+            </a:pPr>
+            <a:r>
+              <a:rPr lang="en-GB" sz="1600" dirty="0"/>
+              <a:t>	</a:t>
+            </a:r>
+            <a:r>
+              <a:rPr lang="en-GB" sz="1600" dirty="0" smtClean="0"/>
+              <a:t>private </a:t>
+            </a:r>
+            <a:r>
+              <a:rPr lang="en-GB" sz="1600" dirty="0" err="1" smtClean="0"/>
               <a:t>val</a:t>
             </a:r>
             <a:r>
-              <a:rPr lang="en-GB" sz="1600" b="1" dirty="0" smtClean="0"/>
-              <a:t> time = Time (9, 0)</a:t>
-            </a:r>
-          </a:p>
-          <a:p>
-            <a:endParaRPr lang="en-GB" sz="1600" dirty="0"/>
-          </a:p>
-          <a:p>
-            <a:r>
-              <a:rPr lang="en-GB" sz="1600" dirty="0" smtClean="0"/>
-              <a:t>In the above example, </a:t>
-            </a:r>
-            <a:r>
-              <a:rPr lang="en-GB" sz="1600" b="1" dirty="0" smtClean="0"/>
-              <a:t>new keyword is not used </a:t>
-            </a:r>
-            <a:r>
-              <a:rPr lang="en-GB" sz="1600" dirty="0" smtClean="0"/>
-              <a:t>to create an object</a:t>
-            </a:r>
-          </a:p>
-          <a:p>
-            <a:r>
-              <a:rPr lang="en-GB" sz="1600" dirty="0" smtClean="0"/>
-              <a:t>Scala compiler creates the companion object and </a:t>
-            </a:r>
-            <a:r>
-              <a:rPr lang="en-GB" sz="1600" b="1" dirty="0" smtClean="0"/>
-              <a:t>apply</a:t>
-            </a:r>
-            <a:r>
-              <a:rPr lang="en-GB" sz="1600" dirty="0" smtClean="0"/>
-              <a:t> method inside companion object which is a factory for that time instance. So, the apply method will call the constructor and creates the new instance of the time class based on the parameters available.</a:t>
-            </a:r>
-          </a:p>
-          <a:p>
-            <a:r>
-              <a:rPr lang="en-GB" sz="1600" b="1" dirty="0" err="1" smtClean="0"/>
-              <a:t>Unapply</a:t>
-            </a:r>
-            <a:r>
-              <a:rPr lang="en-GB" sz="1600" dirty="0"/>
+              <a:rPr lang="en-GB" sz="1600" dirty="0" smtClean="0"/>
               <a:t> </a:t>
             </a:r>
             <a:r>
-              <a:rPr lang="en-GB" sz="1600" dirty="0" smtClean="0"/>
-              <a:t>deconstructs a Case class i.e. when you call the </a:t>
-            </a:r>
-            <a:r>
               <a:rPr lang="en-GB" sz="1600" dirty="0" err="1" smtClean="0"/>
-              <a:t>Unapply</a:t>
-            </a:r>
-            <a:r>
-              <a:rPr lang="en-GB" sz="1600" dirty="0" smtClean="0"/>
-              <a:t> method passing the objects, you will get the </a:t>
-            </a:r>
-            <a:r>
-              <a:rPr lang="en-GB" sz="1600" b="1" dirty="0" smtClean="0"/>
-              <a:t>values </a:t>
-            </a:r>
-            <a:r>
-              <a:rPr lang="en-GB" sz="1600" dirty="0" smtClean="0"/>
-              <a:t>that are inside of the object</a:t>
-            </a:r>
-            <a:endParaRPr lang="en-GB" sz="1000" dirty="0"/>
+              <a:t>defaultMessage</a:t>
+            </a:r>
+            <a:r>
+              <a:rPr lang="en-GB" sz="1600" dirty="0" smtClean="0"/>
+              <a:t> = “Hello!”</a:t>
+            </a:r>
+          </a:p>
+          <a:p>
+            <a:pPr marL="0" indent="0">
+              <a:buNone/>
+            </a:pPr>
+            <a:r>
+              <a:rPr lang="en-GB" sz="1600" dirty="0" smtClean="0"/>
+              <a:t>}</a:t>
+            </a:r>
+          </a:p>
+          <a:p>
+            <a:pPr marL="0" indent="0">
+              <a:buNone/>
+            </a:pPr>
+            <a:endParaRPr lang="en-GB" sz="1400" dirty="0" smtClean="0"/>
+          </a:p>
+          <a:p>
+            <a:pPr marL="0" indent="0">
+              <a:buNone/>
+            </a:pPr>
+            <a:r>
+              <a:rPr lang="en-GB" sz="1400" dirty="0" smtClean="0"/>
+              <a:t>class </a:t>
+            </a:r>
+            <a:r>
+              <a:rPr lang="en-GB" sz="1400" b="1" dirty="0" smtClean="0"/>
+              <a:t>Hello</a:t>
+            </a:r>
+            <a:r>
+              <a:rPr lang="en-GB" sz="1400" dirty="0" smtClean="0"/>
+              <a:t> (message : String = </a:t>
+            </a:r>
+            <a:r>
+              <a:rPr lang="en-GB" sz="1400" dirty="0" err="1" smtClean="0"/>
+              <a:t>Hello.defaultMessage</a:t>
+            </a:r>
+            <a:r>
+              <a:rPr lang="en-GB" sz="1400" dirty="0" smtClean="0"/>
+              <a:t>) {</a:t>
+            </a:r>
+          </a:p>
+          <a:p>
+            <a:pPr marL="0" indent="0">
+              <a:buNone/>
+            </a:pPr>
+            <a:r>
+              <a:rPr lang="en-GB" sz="1400" dirty="0"/>
+              <a:t>	</a:t>
+            </a:r>
+            <a:r>
+              <a:rPr lang="en-GB" sz="1400" dirty="0" err="1" smtClean="0"/>
+              <a:t>println</a:t>
+            </a:r>
+            <a:r>
+              <a:rPr lang="en-GB" sz="1400" dirty="0" smtClean="0"/>
+              <a:t> (message)</a:t>
+            </a:r>
+          </a:p>
+          <a:p>
+            <a:pPr marL="0" indent="0">
+              <a:buNone/>
+            </a:pPr>
+            <a:r>
+              <a:rPr lang="en-GB" sz="1400" dirty="0"/>
+              <a:t>}</a:t>
+            </a:r>
           </a:p>
         </p:txBody>
       </p:sp>
     </p:spTree>
     <p:extLst>
       <p:ext uri="{BB962C8B-B14F-4D97-AF65-F5344CB8AC3E}">
-        <p14:creationId xmlns:p14="http://schemas.microsoft.com/office/powerpoint/2010/main" val="1653185715"/>
+        <p14:creationId xmlns:p14="http://schemas.microsoft.com/office/powerpoint/2010/main" val="3520017557"/>
       </p:ext>
     </p:extLst>
   </p:cSld>
@@ -4368,6 +5227,458 @@
         </p:nvSpPr>
         <p:spPr/>
         <p:txBody>
+          <a:bodyPr>
+            <a:normAutofit fontScale="90000"/>
+          </a:bodyPr>
+          <a:lstStyle/>
+          <a:p>
+            <a:r>
+              <a:rPr lang="en-US" dirty="0" smtClean="0"/>
+              <a:t>Scala – Default Values for Parameters</a:t>
+            </a:r>
+            <a:endParaRPr lang="en-US" dirty="0"/>
+          </a:p>
+        </p:txBody>
+      </p:sp>
+      <p:sp>
+        <p:nvSpPr>
+          <p:cNvPr id="3" name="Content Placeholder 2"/>
+          <p:cNvSpPr>
+            <a:spLocks noGrp="1"/>
+          </p:cNvSpPr>
+          <p:nvPr>
+            <p:ph idx="1"/>
+          </p:nvPr>
+        </p:nvSpPr>
+        <p:spPr/>
+        <p:txBody>
+          <a:bodyPr>
+            <a:normAutofit/>
+          </a:bodyPr>
+          <a:lstStyle/>
+          <a:p>
+            <a:r>
+              <a:rPr lang="en-GB" sz="1600" dirty="0" smtClean="0"/>
+              <a:t>The important usage of default parameter is that you can </a:t>
+            </a:r>
+            <a:r>
+              <a:rPr lang="en-GB" sz="1600" b="1" dirty="0" smtClean="0">
+                <a:solidFill>
+                  <a:srgbClr val="00B050"/>
+                </a:solidFill>
+              </a:rPr>
+              <a:t>avoid method overloading</a:t>
+            </a:r>
+            <a:r>
+              <a:rPr lang="en-GB" sz="1600" dirty="0" smtClean="0"/>
+              <a:t> by having default values for parameters</a:t>
+            </a:r>
+            <a:endParaRPr lang="en-GB" sz="1400" dirty="0"/>
+          </a:p>
+        </p:txBody>
+      </p:sp>
+    </p:spTree>
+    <p:extLst>
+      <p:ext uri="{BB962C8B-B14F-4D97-AF65-F5344CB8AC3E}">
+        <p14:creationId xmlns:p14="http://schemas.microsoft.com/office/powerpoint/2010/main" val="3028284950"/>
+      </p:ext>
+    </p:extLst>
+  </p:cSld>
+  <p:clrMapOvr>
+    <a:masterClrMapping/>
+  </p:clrMapOvr>
+  <p:timing>
+    <p:tnLst>
+      <p:par>
+        <p:cTn id="1" dur="indefinite" restart="never" nodeType="tmRoot"/>
+      </p:par>
+    </p:tnLst>
+  </p:timing>
+</p:sld>
+</file>
+
+<file path=ppt/slides/slide6.xml><?xml version="1.0" encoding="utf-8"?>
+<p:sld xmlns:a="http://schemas.openxmlformats.org/drawingml/2006/main" xmlns:r="http://schemas.openxmlformats.org/officeDocument/2006/relationships" xmlns:p="http://schemas.openxmlformats.org/presentationml/2006/main">
+  <p:cSld>
+    <p:spTree>
+      <p:nvGrpSpPr>
+        <p:cNvPr id="1" name=""/>
+        <p:cNvGrpSpPr/>
+        <p:nvPr/>
+      </p:nvGrpSpPr>
+      <p:grpSpPr>
+        <a:xfrm>
+          <a:off x="0" y="0"/>
+          <a:ext cx="0" cy="0"/>
+          <a:chOff x="0" y="0"/>
+          <a:chExt cx="0" cy="0"/>
+        </a:xfrm>
+      </p:grpSpPr>
+      <p:sp>
+        <p:nvSpPr>
+          <p:cNvPr id="2" name="Title 1"/>
+          <p:cNvSpPr>
+            <a:spLocks noGrp="1"/>
+          </p:cNvSpPr>
+          <p:nvPr>
+            <p:ph type="title"/>
+          </p:nvPr>
+        </p:nvSpPr>
+        <p:spPr/>
+        <p:txBody>
+          <a:bodyPr/>
+          <a:lstStyle/>
+          <a:p>
+            <a:r>
+              <a:rPr lang="en-US" dirty="0" smtClean="0"/>
+              <a:t>Scala – Case Classes &amp; Objects</a:t>
+            </a:r>
+            <a:endParaRPr lang="en-US" dirty="0"/>
+          </a:p>
+        </p:txBody>
+      </p:sp>
+      <p:sp>
+        <p:nvSpPr>
+          <p:cNvPr id="3" name="Content Placeholder 2"/>
+          <p:cNvSpPr>
+            <a:spLocks noGrp="1"/>
+          </p:cNvSpPr>
+          <p:nvPr>
+            <p:ph idx="1"/>
+          </p:nvPr>
+        </p:nvSpPr>
+        <p:spPr/>
+        <p:txBody>
+          <a:bodyPr>
+            <a:normAutofit/>
+          </a:bodyPr>
+          <a:lstStyle/>
+          <a:p>
+            <a:r>
+              <a:rPr lang="en-GB" sz="1600" b="1" dirty="0" smtClean="0"/>
+              <a:t>Case Class:-</a:t>
+            </a:r>
+          </a:p>
+          <a:p>
+            <a:pPr lvl="1"/>
+            <a:r>
+              <a:rPr lang="en-GB" sz="1400" dirty="0" smtClean="0"/>
+              <a:t>Generates JVM-specific convenience methods</a:t>
+            </a:r>
+          </a:p>
+          <a:p>
+            <a:pPr lvl="1"/>
+            <a:r>
+              <a:rPr lang="en-GB" sz="1400" dirty="0" smtClean="0"/>
+              <a:t>Makes every class parameter a </a:t>
+            </a:r>
+            <a:r>
+              <a:rPr lang="en-GB" sz="1400" b="1" dirty="0" smtClean="0"/>
+              <a:t>field </a:t>
+            </a:r>
+            <a:r>
+              <a:rPr lang="en-GB" sz="1400" dirty="0" smtClean="0"/>
+              <a:t>(field means – it is basically an instance field)</a:t>
+            </a:r>
+          </a:p>
+          <a:p>
+            <a:pPr lvl="1"/>
+            <a:r>
+              <a:rPr lang="en-GB" sz="1400" b="1" dirty="0" smtClean="0"/>
+              <a:t>Immutable</a:t>
+            </a:r>
+            <a:r>
+              <a:rPr lang="en-GB" sz="1400" dirty="0" smtClean="0"/>
+              <a:t> by default</a:t>
+            </a:r>
+          </a:p>
+          <a:p>
+            <a:pPr lvl="1"/>
+            <a:r>
+              <a:rPr lang="en-GB" sz="1400" dirty="0" smtClean="0"/>
+              <a:t>Performs value-based equivalent by default (rather than checking the object instances to determine whether they are equal)</a:t>
+            </a:r>
+          </a:p>
+          <a:p>
+            <a:pPr lvl="1"/>
+            <a:endParaRPr lang="en-GB" sz="1000" b="1" dirty="0" smtClean="0"/>
+          </a:p>
+          <a:p>
+            <a:r>
+              <a:rPr lang="en-GB" sz="1600" b="1" dirty="0"/>
+              <a:t>Case </a:t>
+            </a:r>
+            <a:r>
+              <a:rPr lang="en-GB" sz="1600" b="1" dirty="0" smtClean="0"/>
+              <a:t>Object:-</a:t>
+            </a:r>
+          </a:p>
+          <a:p>
+            <a:pPr lvl="1"/>
+            <a:r>
+              <a:rPr lang="en-GB" sz="1400" dirty="0" smtClean="0"/>
+              <a:t>If a case class is an instance-based representation of a data type, a case object is a representation of a data type of which there can only be a </a:t>
+            </a:r>
+            <a:r>
+              <a:rPr lang="en-GB" sz="1400" b="1" dirty="0" smtClean="0"/>
+              <a:t>single instance</a:t>
+            </a:r>
+          </a:p>
+          <a:p>
+            <a:pPr lvl="1"/>
+            <a:r>
+              <a:rPr lang="en-GB" sz="1400" dirty="0" smtClean="0"/>
+              <a:t>If you try to create a case class with </a:t>
+            </a:r>
+            <a:r>
+              <a:rPr lang="en-GB" sz="1400" b="1" dirty="0" smtClean="0">
+                <a:solidFill>
+                  <a:srgbClr val="FF0000"/>
+                </a:solidFill>
+              </a:rPr>
+              <a:t>no</a:t>
+            </a:r>
+            <a:r>
+              <a:rPr lang="en-GB" sz="1400" dirty="0" smtClean="0"/>
+              <a:t> parameters, it is </a:t>
+            </a:r>
+            <a:r>
+              <a:rPr lang="en-GB" sz="1400" b="1" dirty="0" smtClean="0"/>
+              <a:t>stateless </a:t>
+            </a:r>
+            <a:r>
+              <a:rPr lang="en-GB" sz="1400" dirty="0" smtClean="0"/>
+              <a:t>and should be a case object</a:t>
+            </a:r>
+            <a:endParaRPr lang="en-GB" sz="1400" b="1" dirty="0"/>
+          </a:p>
+          <a:p>
+            <a:pPr lvl="1"/>
+            <a:endParaRPr lang="en-GB" sz="1000" b="1" dirty="0"/>
+          </a:p>
+        </p:txBody>
+      </p:sp>
+    </p:spTree>
+    <p:extLst>
+      <p:ext uri="{BB962C8B-B14F-4D97-AF65-F5344CB8AC3E}">
+        <p14:creationId xmlns:p14="http://schemas.microsoft.com/office/powerpoint/2010/main" val="3381182667"/>
+      </p:ext>
+    </p:extLst>
+  </p:cSld>
+  <p:clrMapOvr>
+    <a:masterClrMapping/>
+  </p:clrMapOvr>
+  <p:timing>
+    <p:tnLst>
+      <p:par>
+        <p:cTn id="1" dur="indefinite" restart="never" nodeType="tmRoot"/>
+      </p:par>
+    </p:tnLst>
+  </p:timing>
+</p:sld>
+</file>
+
+<file path=ppt/slides/slide7.xml><?xml version="1.0" encoding="utf-8"?>
+<p:sld xmlns:a="http://schemas.openxmlformats.org/drawingml/2006/main" xmlns:r="http://schemas.openxmlformats.org/officeDocument/2006/relationships" xmlns:p="http://schemas.openxmlformats.org/presentationml/2006/main">
+  <p:cSld>
+    <p:spTree>
+      <p:nvGrpSpPr>
+        <p:cNvPr id="1" name=""/>
+        <p:cNvGrpSpPr/>
+        <p:nvPr/>
+      </p:nvGrpSpPr>
+      <p:grpSpPr>
+        <a:xfrm>
+          <a:off x="0" y="0"/>
+          <a:ext cx="0" cy="0"/>
+          <a:chOff x="0" y="0"/>
+          <a:chExt cx="0" cy="0"/>
+        </a:xfrm>
+      </p:grpSpPr>
+      <p:sp>
+        <p:nvSpPr>
+          <p:cNvPr id="2" name="Title 1"/>
+          <p:cNvSpPr>
+            <a:spLocks noGrp="1"/>
+          </p:cNvSpPr>
+          <p:nvPr>
+            <p:ph type="title"/>
+          </p:nvPr>
+        </p:nvSpPr>
+        <p:spPr/>
+        <p:txBody>
+          <a:bodyPr/>
+          <a:lstStyle/>
+          <a:p>
+            <a:r>
+              <a:rPr lang="en-US" dirty="0" smtClean="0"/>
+              <a:t>Scala – Apply and UnApply</a:t>
+            </a:r>
+            <a:endParaRPr lang="en-US" dirty="0"/>
+          </a:p>
+        </p:txBody>
+      </p:sp>
+      <p:sp>
+        <p:nvSpPr>
+          <p:cNvPr id="3" name="Content Placeholder 2"/>
+          <p:cNvSpPr>
+            <a:spLocks noGrp="1"/>
+          </p:cNvSpPr>
+          <p:nvPr>
+            <p:ph idx="1"/>
+          </p:nvPr>
+        </p:nvSpPr>
+        <p:spPr/>
+        <p:txBody>
+          <a:bodyPr>
+            <a:normAutofit/>
+          </a:bodyPr>
+          <a:lstStyle/>
+          <a:p>
+            <a:r>
+              <a:rPr lang="en-GB" sz="1600" b="1" dirty="0" smtClean="0"/>
+              <a:t>case class Time(hours : </a:t>
+            </a:r>
+            <a:r>
+              <a:rPr lang="en-GB" sz="1600" b="1" dirty="0" err="1" smtClean="0"/>
+              <a:t>Int</a:t>
+            </a:r>
+            <a:r>
+              <a:rPr lang="en-GB" sz="1600" b="1" dirty="0" smtClean="0"/>
+              <a:t> = 0, minutes: </a:t>
+            </a:r>
+            <a:r>
+              <a:rPr lang="en-GB" sz="1600" b="1" dirty="0" err="1" smtClean="0"/>
+              <a:t>Int</a:t>
+            </a:r>
+            <a:r>
+              <a:rPr lang="en-GB" sz="1600" b="1" dirty="0" smtClean="0"/>
+              <a:t> = 0)</a:t>
+            </a:r>
+          </a:p>
+          <a:p>
+            <a:r>
+              <a:rPr lang="en-GB" sz="1600" b="1" dirty="0" err="1" smtClean="0"/>
+              <a:t>val</a:t>
+            </a:r>
+            <a:r>
+              <a:rPr lang="en-GB" sz="1600" b="1" dirty="0" smtClean="0"/>
+              <a:t> time = Time (9, 0)</a:t>
+            </a:r>
+          </a:p>
+          <a:p>
+            <a:endParaRPr lang="en-GB" sz="1600" dirty="0"/>
+          </a:p>
+          <a:p>
+            <a:r>
+              <a:rPr lang="en-GB" sz="1600" dirty="0" smtClean="0"/>
+              <a:t>In the above example, </a:t>
+            </a:r>
+            <a:r>
+              <a:rPr lang="en-GB" sz="1600" b="1" dirty="0" smtClean="0"/>
+              <a:t>new keyword is not used </a:t>
+            </a:r>
+            <a:r>
+              <a:rPr lang="en-GB" sz="1600" dirty="0" smtClean="0"/>
+              <a:t>to create an object</a:t>
+            </a:r>
+          </a:p>
+          <a:p>
+            <a:r>
+              <a:rPr lang="en-GB" sz="1600" dirty="0" smtClean="0"/>
+              <a:t>Scala compiler creates the companion object and </a:t>
+            </a:r>
+            <a:r>
+              <a:rPr lang="en-GB" sz="1600" b="1" dirty="0" smtClean="0"/>
+              <a:t>apply</a:t>
+            </a:r>
+            <a:r>
+              <a:rPr lang="en-GB" sz="1600" dirty="0" smtClean="0"/>
+              <a:t> method inside companion object which is a factory for that time instance. So, the apply method will call the constructor and creates the new instance of the time class based on the parameters available.</a:t>
+            </a:r>
+          </a:p>
+          <a:p>
+            <a:r>
+              <a:rPr lang="en-GB" sz="1600" b="1" dirty="0" err="1" smtClean="0"/>
+              <a:t>Unapply</a:t>
+            </a:r>
+            <a:r>
+              <a:rPr lang="en-GB" sz="1600" dirty="0"/>
+              <a:t> </a:t>
+            </a:r>
+            <a:r>
+              <a:rPr lang="en-GB" sz="1600" dirty="0" smtClean="0"/>
+              <a:t>deconstructs a Case class i.e. when you call the </a:t>
+            </a:r>
+            <a:r>
+              <a:rPr lang="en-GB" sz="1600" dirty="0" err="1" smtClean="0"/>
+              <a:t>Unapply</a:t>
+            </a:r>
+            <a:r>
+              <a:rPr lang="en-GB" sz="1600" dirty="0" smtClean="0"/>
+              <a:t> method passing the objects, you will get the </a:t>
+            </a:r>
+            <a:r>
+              <a:rPr lang="en-GB" sz="1600" b="1" dirty="0" smtClean="0"/>
+              <a:t>values </a:t>
+            </a:r>
+            <a:r>
+              <a:rPr lang="en-GB" sz="1600" dirty="0" smtClean="0"/>
+              <a:t>that are inside of the object</a:t>
+            </a:r>
+            <a:endParaRPr lang="en-GB" sz="1000" dirty="0"/>
+          </a:p>
+        </p:txBody>
+      </p:sp>
+    </p:spTree>
+    <p:extLst>
+      <p:ext uri="{BB962C8B-B14F-4D97-AF65-F5344CB8AC3E}">
+        <p14:creationId xmlns:p14="http://schemas.microsoft.com/office/powerpoint/2010/main" val="1653185715"/>
+      </p:ext>
+    </p:extLst>
+  </p:cSld>
+  <p:clrMapOvr>
+    <a:masterClrMapping/>
+  </p:clrMapOvr>
+  <p:timing>
+    <p:tnLst>
+      <p:par>
+        <p:cTn id="1" dur="indefinite" restart="never" nodeType="tmRoot"/>
+      </p:par>
+    </p:tnLst>
+  </p:timing>
+</p:sld>
+</file>
+
+<file path=ppt/slides/slide8.xml><?xml version="1.0" encoding="utf-8"?>
+<p:sld xmlns:a="http://schemas.openxmlformats.org/drawingml/2006/main" xmlns:r="http://schemas.openxmlformats.org/officeDocument/2006/relationships" xmlns:p="http://schemas.openxmlformats.org/presentationml/2006/main">
+  <p:cSld>
+    <p:spTree>
+      <p:nvGrpSpPr>
+        <p:cNvPr id="1" name=""/>
+        <p:cNvGrpSpPr/>
+        <p:nvPr/>
+      </p:nvGrpSpPr>
+      <p:grpSpPr>
+        <a:xfrm>
+          <a:off x="0" y="0"/>
+          <a:ext cx="0" cy="0"/>
+          <a:chOff x="0" y="0"/>
+          <a:chExt cx="0" cy="0"/>
+        </a:xfrm>
+      </p:grpSpPr>
+      <p:sp>
+        <p:nvSpPr>
+          <p:cNvPr id="2" name="Title 1"/>
+          <p:cNvSpPr>
+            <a:spLocks noGrp="1"/>
+          </p:cNvSpPr>
+          <p:nvPr>
+            <p:ph type="title"/>
+          </p:nvPr>
+        </p:nvSpPr>
+        <p:spPr/>
+        <p:txBody>
           <a:bodyPr/>
           <a:lstStyle/>
           <a:p>
@@ -4517,7 +5828,7 @@
 </p:sld>
 </file>
 
-<file path=ppt/slides/slide6.xml><?xml version="1.0" encoding="utf-8"?>
+<file path=ppt/slides/slide9.xml><?xml version="1.0" encoding="utf-8"?>
 <p:sld xmlns:a="http://schemas.openxmlformats.org/drawingml/2006/main" xmlns:r="http://schemas.openxmlformats.org/officeDocument/2006/relationships" xmlns:p="http://schemas.openxmlformats.org/presentationml/2006/main">
   <p:cSld>
     <p:spTree>
@@ -4762,554 +6073,6 @@
     <p:extLst>
       <p:ext uri="{BB962C8B-B14F-4D97-AF65-F5344CB8AC3E}">
         <p14:creationId xmlns:p14="http://schemas.microsoft.com/office/powerpoint/2010/main" val="1044900234"/>
-      </p:ext>
-    </p:extLst>
-  </p:cSld>
-  <p:clrMapOvr>
-    <a:masterClrMapping/>
-  </p:clrMapOvr>
-  <p:timing>
-    <p:tnLst>
-      <p:par>
-        <p:cTn id="1" dur="indefinite" restart="never" nodeType="tmRoot"/>
-      </p:par>
-    </p:tnLst>
-  </p:timing>
-</p:sld>
-</file>
-
-<file path=ppt/slides/slide7.xml><?xml version="1.0" encoding="utf-8"?>
-<p:sld xmlns:a="http://schemas.openxmlformats.org/drawingml/2006/main" xmlns:r="http://schemas.openxmlformats.org/officeDocument/2006/relationships" xmlns:p="http://schemas.openxmlformats.org/presentationml/2006/main">
-  <p:cSld>
-    <p:spTree>
-      <p:nvGrpSpPr>
-        <p:cNvPr id="1" name=""/>
-        <p:cNvGrpSpPr/>
-        <p:nvPr/>
-      </p:nvGrpSpPr>
-      <p:grpSpPr>
-        <a:xfrm>
-          <a:off x="0" y="0"/>
-          <a:ext cx="0" cy="0"/>
-          <a:chOff x="0" y="0"/>
-          <a:chExt cx="0" cy="0"/>
-        </a:xfrm>
-      </p:grpSpPr>
-      <p:sp>
-        <p:nvSpPr>
-          <p:cNvPr id="2" name="Title 1"/>
-          <p:cNvSpPr>
-            <a:spLocks noGrp="1"/>
-          </p:cNvSpPr>
-          <p:nvPr>
-            <p:ph type="title"/>
-          </p:nvPr>
-        </p:nvSpPr>
-        <p:spPr/>
-        <p:txBody>
-          <a:bodyPr/>
-          <a:lstStyle/>
-          <a:p>
-            <a:r>
-              <a:rPr lang="en-US" dirty="0" smtClean="0"/>
-              <a:t>Vectors</a:t>
-            </a:r>
-            <a:r>
-              <a:rPr lang="en-US" dirty="0"/>
-              <a:t>, Sets – Sequence Collections</a:t>
-            </a:r>
-            <a:endParaRPr lang="en-US" dirty="0"/>
-          </a:p>
-        </p:txBody>
-      </p:sp>
-      <p:sp>
-        <p:nvSpPr>
-          <p:cNvPr id="3" name="Content Placeholder 2"/>
-          <p:cNvSpPr>
-            <a:spLocks noGrp="1"/>
-          </p:cNvSpPr>
-          <p:nvPr>
-            <p:ph idx="1"/>
-          </p:nvPr>
-        </p:nvSpPr>
-        <p:spPr/>
-        <p:txBody>
-          <a:bodyPr>
-            <a:normAutofit/>
-          </a:bodyPr>
-          <a:lstStyle/>
-          <a:p>
-            <a:pPr marL="0" indent="0">
-              <a:buNone/>
-            </a:pPr>
-            <a:r>
-              <a:rPr lang="en-GB" sz="1800" b="1" dirty="0" smtClean="0"/>
-              <a:t>Vectors:-</a:t>
-            </a:r>
-          </a:p>
-          <a:p>
-            <a:r>
-              <a:rPr lang="en-GB" sz="1600" dirty="0" smtClean="0"/>
-              <a:t>A </a:t>
-            </a:r>
-            <a:r>
-              <a:rPr lang="en-GB" sz="1600" b="1" dirty="0" smtClean="0"/>
-              <a:t>linked list</a:t>
-            </a:r>
-            <a:r>
-              <a:rPr lang="en-GB" sz="1600" dirty="0" smtClean="0"/>
-              <a:t> of 32 element arrays</a:t>
-            </a:r>
-          </a:p>
-          <a:p>
-            <a:r>
-              <a:rPr lang="en-GB" sz="1600" dirty="0" smtClean="0"/>
-              <a:t>2.15 billion possible elements</a:t>
-            </a:r>
-          </a:p>
-          <a:p>
-            <a:r>
-              <a:rPr lang="en-GB" sz="1600" dirty="0" smtClean="0"/>
-              <a:t>Indexed by hashing</a:t>
-            </a:r>
-          </a:p>
-          <a:p>
-            <a:r>
-              <a:rPr lang="en-GB" sz="1600" dirty="0" smtClean="0"/>
-              <a:t>Good performance</a:t>
-            </a:r>
-          </a:p>
-          <a:p>
-            <a:pPr marL="0" indent="0">
-              <a:buNone/>
-            </a:pPr>
-            <a:endParaRPr lang="en-GB" sz="1600" dirty="0"/>
-          </a:p>
-          <a:p>
-            <a:pPr marL="0" indent="0">
-              <a:buNone/>
-            </a:pPr>
-            <a:r>
-              <a:rPr lang="en-GB" sz="1600" b="1" dirty="0" smtClean="0"/>
-              <a:t>Sets:-</a:t>
-            </a:r>
-          </a:p>
-          <a:p>
-            <a:r>
-              <a:rPr lang="en-GB" sz="1600" dirty="0" smtClean="0"/>
-              <a:t>No duplicates permitted</a:t>
-            </a:r>
-          </a:p>
-          <a:p>
-            <a:r>
-              <a:rPr lang="en-GB" sz="1600" dirty="0" smtClean="0"/>
-              <a:t>Order is not guaranteed</a:t>
-            </a:r>
-          </a:p>
-          <a:p>
-            <a:r>
-              <a:rPr lang="en-GB" sz="1600" dirty="0" smtClean="0"/>
-              <a:t>The </a:t>
-            </a:r>
-            <a:r>
-              <a:rPr lang="en-GB" sz="1600" b="1" dirty="0" smtClean="0"/>
-              <a:t>apply</a:t>
-            </a:r>
-            <a:r>
-              <a:rPr lang="en-GB" sz="1600" dirty="0" smtClean="0"/>
-              <a:t> method on an instance checks to see if the set contains a value</a:t>
-            </a:r>
-            <a:endParaRPr lang="en-GB" sz="1600" dirty="0"/>
-          </a:p>
-          <a:p>
-            <a:pPr marL="0" indent="0">
-              <a:buNone/>
-            </a:pPr>
-            <a:endParaRPr lang="en-GB" sz="1600" b="1" dirty="0"/>
-          </a:p>
-          <a:p>
-            <a:pPr marL="0" indent="0">
-              <a:buNone/>
-            </a:pPr>
-            <a:endParaRPr lang="en-GB" sz="1600" dirty="0"/>
-          </a:p>
-        </p:txBody>
-      </p:sp>
-    </p:spTree>
-    <p:extLst>
-      <p:ext uri="{BB962C8B-B14F-4D97-AF65-F5344CB8AC3E}">
-        <p14:creationId xmlns:p14="http://schemas.microsoft.com/office/powerpoint/2010/main" val="1718666759"/>
-      </p:ext>
-    </p:extLst>
-  </p:cSld>
-  <p:clrMapOvr>
-    <a:masterClrMapping/>
-  </p:clrMapOvr>
-  <p:timing>
-    <p:tnLst>
-      <p:par>
-        <p:cTn id="1" dur="indefinite" restart="never" nodeType="tmRoot"/>
-      </p:par>
-    </p:tnLst>
-  </p:timing>
-</p:sld>
-</file>
-
-<file path=ppt/slides/slide8.xml><?xml version="1.0" encoding="utf-8"?>
-<p:sld xmlns:a="http://schemas.openxmlformats.org/drawingml/2006/main" xmlns:r="http://schemas.openxmlformats.org/officeDocument/2006/relationships" xmlns:p="http://schemas.openxmlformats.org/presentationml/2006/main">
-  <p:cSld>
-    <p:spTree>
-      <p:nvGrpSpPr>
-        <p:cNvPr id="1" name=""/>
-        <p:cNvGrpSpPr/>
-        <p:nvPr/>
-      </p:nvGrpSpPr>
-      <p:grpSpPr>
-        <a:xfrm>
-          <a:off x="0" y="0"/>
-          <a:ext cx="0" cy="0"/>
-          <a:chOff x="0" y="0"/>
-          <a:chExt cx="0" cy="0"/>
-        </a:xfrm>
-      </p:grpSpPr>
-      <p:sp>
-        <p:nvSpPr>
-          <p:cNvPr id="2" name="Title 1"/>
-          <p:cNvSpPr>
-            <a:spLocks noGrp="1"/>
-          </p:cNvSpPr>
-          <p:nvPr>
-            <p:ph type="title"/>
-          </p:nvPr>
-        </p:nvSpPr>
-        <p:spPr/>
-        <p:txBody>
-          <a:bodyPr/>
-          <a:lstStyle/>
-          <a:p>
-            <a:r>
-              <a:rPr lang="en-US" dirty="0" smtClean="0"/>
-              <a:t>Option</a:t>
-            </a:r>
-            <a:endParaRPr lang="en-US" dirty="0"/>
-          </a:p>
-        </p:txBody>
-      </p:sp>
-      <p:sp>
-        <p:nvSpPr>
-          <p:cNvPr id="3" name="Content Placeholder 2"/>
-          <p:cNvSpPr>
-            <a:spLocks noGrp="1"/>
-          </p:cNvSpPr>
-          <p:nvPr>
-            <p:ph idx="1"/>
-          </p:nvPr>
-        </p:nvSpPr>
-        <p:spPr/>
-        <p:txBody>
-          <a:bodyPr>
-            <a:normAutofit/>
-          </a:bodyPr>
-          <a:lstStyle/>
-          <a:p>
-            <a:pPr marL="0" indent="0">
-              <a:buNone/>
-            </a:pPr>
-            <a:r>
-              <a:rPr lang="en-GB" sz="1800" b="1" dirty="0" smtClean="0"/>
-              <a:t>Algebraic Data Types (ADTs):-</a:t>
-            </a:r>
-          </a:p>
-          <a:p>
-            <a:r>
-              <a:rPr lang="en-GB" sz="1600" dirty="0" smtClean="0"/>
-              <a:t>A distinct set of possible types</a:t>
-            </a:r>
-          </a:p>
-          <a:p>
-            <a:r>
-              <a:rPr lang="en-GB" sz="1600" b="1" dirty="0" smtClean="0"/>
-              <a:t>Example :</a:t>
-            </a:r>
-            <a:r>
-              <a:rPr lang="en-GB" sz="1600" dirty="0" smtClean="0"/>
-              <a:t> </a:t>
-            </a:r>
-            <a:r>
-              <a:rPr lang="en-GB" sz="1600" dirty="0"/>
-              <a:t>D</a:t>
-            </a:r>
-            <a:r>
-              <a:rPr lang="en-GB" sz="1600" dirty="0" smtClean="0"/>
-              <a:t>ays in a week, True/False</a:t>
-            </a:r>
-          </a:p>
-          <a:p>
-            <a:endParaRPr lang="en-GB" sz="1600" dirty="0"/>
-          </a:p>
-          <a:p>
-            <a:pPr marL="0" indent="0">
-              <a:buNone/>
-            </a:pPr>
-            <a:r>
-              <a:rPr lang="en-GB" sz="1600" b="1" dirty="0" smtClean="0"/>
-              <a:t>Option:-</a:t>
-            </a:r>
-          </a:p>
-          <a:p>
-            <a:r>
-              <a:rPr lang="en-GB" sz="1600" dirty="0" smtClean="0"/>
-              <a:t>Not a collection, but a container</a:t>
-            </a:r>
-          </a:p>
-          <a:p>
-            <a:r>
-              <a:rPr lang="en-GB" sz="1600" b="1" dirty="0" smtClean="0"/>
-              <a:t>Some – </a:t>
-            </a:r>
-            <a:r>
-              <a:rPr lang="en-GB" sz="1600" dirty="0" smtClean="0"/>
-              <a:t>Representation of the value</a:t>
-            </a:r>
-          </a:p>
-          <a:p>
-            <a:r>
-              <a:rPr lang="en-GB" sz="1600" b="1" dirty="0" smtClean="0"/>
-              <a:t>None – </a:t>
-            </a:r>
-            <a:r>
-              <a:rPr lang="en-GB" sz="1600" dirty="0" smtClean="0"/>
-              <a:t>Representation of the absence of a value</a:t>
-            </a:r>
-          </a:p>
-          <a:p>
-            <a:r>
-              <a:rPr lang="en-GB" sz="1600" dirty="0" smtClean="0"/>
-              <a:t>Allows us to avoid null on the JVM</a:t>
-            </a:r>
-            <a:endParaRPr lang="en-GB" sz="1600" dirty="0"/>
-          </a:p>
-          <a:p>
-            <a:endParaRPr lang="en-GB" sz="1600" dirty="0" smtClean="0"/>
-          </a:p>
-        </p:txBody>
-      </p:sp>
-    </p:spTree>
-    <p:extLst>
-      <p:ext uri="{BB962C8B-B14F-4D97-AF65-F5344CB8AC3E}">
-        <p14:creationId xmlns:p14="http://schemas.microsoft.com/office/powerpoint/2010/main" val="963193061"/>
-      </p:ext>
-    </p:extLst>
-  </p:cSld>
-  <p:clrMapOvr>
-    <a:masterClrMapping/>
-  </p:clrMapOvr>
-  <p:timing>
-    <p:tnLst>
-      <p:par>
-        <p:cTn id="1" dur="indefinite" restart="never" nodeType="tmRoot"/>
-      </p:par>
-    </p:tnLst>
-  </p:timing>
-</p:sld>
-</file>
-
-<file path=ppt/slides/slide9.xml><?xml version="1.0" encoding="utf-8"?>
-<p:sld xmlns:a="http://schemas.openxmlformats.org/drawingml/2006/main" xmlns:r="http://schemas.openxmlformats.org/officeDocument/2006/relationships" xmlns:p="http://schemas.openxmlformats.org/presentationml/2006/main">
-  <p:cSld>
-    <p:spTree>
-      <p:nvGrpSpPr>
-        <p:cNvPr id="1" name=""/>
-        <p:cNvGrpSpPr/>
-        <p:nvPr/>
-      </p:nvGrpSpPr>
-      <p:grpSpPr>
-        <a:xfrm>
-          <a:off x="0" y="0"/>
-          <a:ext cx="0" cy="0"/>
-          <a:chOff x="0" y="0"/>
-          <a:chExt cx="0" cy="0"/>
-        </a:xfrm>
-      </p:grpSpPr>
-      <p:sp>
-        <p:nvSpPr>
-          <p:cNvPr id="2" name="Title 1"/>
-          <p:cNvSpPr>
-            <a:spLocks noGrp="1"/>
-          </p:cNvSpPr>
-          <p:nvPr>
-            <p:ph type="title"/>
-          </p:nvPr>
-        </p:nvSpPr>
-        <p:spPr/>
-        <p:txBody>
-          <a:bodyPr/>
-          <a:lstStyle/>
-          <a:p>
-            <a:r>
-              <a:rPr lang="en-US" dirty="0" smtClean="0"/>
-              <a:t>Tuples and Maps</a:t>
-            </a:r>
-            <a:endParaRPr lang="en-US" dirty="0"/>
-          </a:p>
-        </p:txBody>
-      </p:sp>
-      <p:sp>
-        <p:nvSpPr>
-          <p:cNvPr id="3" name="Content Placeholder 2"/>
-          <p:cNvSpPr>
-            <a:spLocks noGrp="1"/>
-          </p:cNvSpPr>
-          <p:nvPr>
-            <p:ph idx="1"/>
-          </p:nvPr>
-        </p:nvSpPr>
-        <p:spPr/>
-        <p:txBody>
-          <a:bodyPr>
-            <a:normAutofit/>
-          </a:bodyPr>
-          <a:lstStyle/>
-          <a:p>
-            <a:pPr marL="0" indent="0">
-              <a:buNone/>
-            </a:pPr>
-            <a:r>
-              <a:rPr lang="en-GB" sz="1800" b="1" dirty="0" smtClean="0"/>
-              <a:t>Tuples:-</a:t>
-            </a:r>
-          </a:p>
-          <a:p>
-            <a:r>
-              <a:rPr lang="en-GB" sz="1600" dirty="0" smtClean="0"/>
-              <a:t>A loose aggregation of values into a single container</a:t>
-            </a:r>
-          </a:p>
-          <a:p>
-            <a:r>
-              <a:rPr lang="en-GB" sz="1600" dirty="0" smtClean="0"/>
-              <a:t>Can have up to </a:t>
-            </a:r>
-            <a:r>
-              <a:rPr lang="en-GB" sz="1600" b="1" dirty="0" smtClean="0"/>
-              <a:t>22 values</a:t>
-            </a:r>
-            <a:r>
-              <a:rPr lang="en-GB" sz="1600" dirty="0" smtClean="0"/>
-              <a:t> in Scala </a:t>
-            </a:r>
-          </a:p>
-          <a:p>
-            <a:r>
-              <a:rPr lang="en-GB" sz="1600" dirty="0" smtClean="0"/>
-              <a:t>Can be accessed using a 1-based accessor for each value</a:t>
-            </a:r>
-          </a:p>
-          <a:p>
-            <a:pPr marL="0" indent="0">
-              <a:buNone/>
-            </a:pPr>
-            <a:endParaRPr lang="en-GB" sz="1600" dirty="0"/>
-          </a:p>
-          <a:p>
-            <a:pPr marL="0" indent="0">
-              <a:buNone/>
-            </a:pPr>
-            <a:r>
-              <a:rPr lang="en-GB" sz="1600" b="1" dirty="0" smtClean="0"/>
-              <a:t>Example:-</a:t>
-            </a:r>
-          </a:p>
-          <a:p>
-            <a:pPr marL="0" indent="0">
-              <a:buNone/>
-            </a:pPr>
-            <a:r>
-              <a:rPr lang="en-GB" sz="1600" dirty="0" err="1" smtClean="0"/>
-              <a:t>val</a:t>
-            </a:r>
-            <a:r>
-              <a:rPr lang="en-GB" sz="1600" dirty="0" smtClean="0"/>
-              <a:t> tuple = (1, “a”, 2, “b”);</a:t>
-            </a:r>
-          </a:p>
-          <a:p>
-            <a:pPr marL="0" indent="0">
-              <a:buNone/>
-            </a:pPr>
-            <a:r>
-              <a:rPr lang="en-GB" sz="1600" dirty="0" smtClean="0"/>
-              <a:t>tuple._3	</a:t>
-            </a:r>
-            <a:r>
-              <a:rPr lang="en-GB" sz="1600" dirty="0" smtClean="0">
-                <a:sym typeface="Wingdings" panose="05000000000000000000" pitchFamily="2" charset="2"/>
-              </a:rPr>
-              <a:t> will give you </a:t>
-            </a:r>
-            <a:r>
-              <a:rPr lang="en-GB" sz="1600" b="1" dirty="0" err="1" smtClean="0">
-                <a:sym typeface="Wingdings" panose="05000000000000000000" pitchFamily="2" charset="2"/>
-              </a:rPr>
-              <a:t>Int</a:t>
-            </a:r>
-            <a:r>
-              <a:rPr lang="en-GB" sz="1600" b="1" dirty="0" smtClean="0">
-                <a:sym typeface="Wingdings" panose="05000000000000000000" pitchFamily="2" charset="2"/>
-              </a:rPr>
-              <a:t> = 2</a:t>
-            </a:r>
-            <a:endParaRPr lang="en-GB" sz="1600" b="1" dirty="0" smtClean="0"/>
-          </a:p>
-          <a:p>
-            <a:pPr marL="0" indent="0">
-              <a:buNone/>
-            </a:pPr>
-            <a:endParaRPr lang="en-GB" sz="1600" dirty="0"/>
-          </a:p>
-          <a:p>
-            <a:pPr marL="0" indent="0">
-              <a:buNone/>
-            </a:pPr>
-            <a:r>
-              <a:rPr lang="en-GB" sz="1600" b="1" dirty="0" smtClean="0"/>
-              <a:t>Map:-</a:t>
-            </a:r>
-          </a:p>
-          <a:p>
-            <a:r>
-              <a:rPr lang="en-GB" sz="1600" dirty="0" smtClean="0"/>
-              <a:t>A grouping of data by key to value, which are tuple “entries”</a:t>
-            </a:r>
-          </a:p>
-          <a:p>
-            <a:r>
-              <a:rPr lang="en-GB" sz="1600" dirty="0" smtClean="0"/>
-              <a:t>Common implementations – </a:t>
-            </a:r>
-            <a:r>
-              <a:rPr lang="en-GB" sz="1600" dirty="0" err="1" smtClean="0"/>
-              <a:t>HashMap</a:t>
-            </a:r>
-            <a:r>
-              <a:rPr lang="en-GB" sz="1600" dirty="0" smtClean="0"/>
-              <a:t>, </a:t>
-            </a:r>
-            <a:r>
-              <a:rPr lang="en-GB" sz="1600" dirty="0" err="1" smtClean="0"/>
-              <a:t>TreeMap</a:t>
-            </a:r>
-            <a:endParaRPr lang="en-GB" sz="1600" dirty="0" smtClean="0"/>
-          </a:p>
-          <a:p>
-            <a:endParaRPr lang="en-GB" sz="1600" dirty="0" smtClean="0"/>
-          </a:p>
-        </p:txBody>
-      </p:sp>
-    </p:spTree>
-    <p:extLst>
-      <p:ext uri="{BB962C8B-B14F-4D97-AF65-F5344CB8AC3E}">
-        <p14:creationId xmlns:p14="http://schemas.microsoft.com/office/powerpoint/2010/main" val="1500972101"/>
       </p:ext>
     </p:extLst>
   </p:cSld>

</xml_diff>